<commit_message>
Focus chapter up to 21 pages.
</commit_message>
<xml_diff>
--- a/Focus/hex1view.pptx
+++ b/Focus/hex1view.pptx
@@ -2,12 +2,12 @@
 <file path=ppt/presentation.xml><?xml version="1.0" encoding="utf-8"?>
 <p:presentation xmlns:a="http://schemas.openxmlformats.org/drawingml/2006/main" xmlns:r="http://schemas.openxmlformats.org/officeDocument/2006/relationships" xmlns:p="http://schemas.openxmlformats.org/presentationml/2006/main" saveSubsetFonts="1" autoCompressPictures="0">
   <p:sldMasterIdLst>
-    <p:sldMasterId id="2147483648" r:id="rId1"/>
+    <p:sldMasterId id="2147483672" r:id="rId1"/>
   </p:sldMasterIdLst>
   <p:sldIdLst>
     <p:sldId id="257" r:id="rId2"/>
   </p:sldIdLst>
-  <p:sldSz cx="12192000" cy="6858000"/>
+  <p:sldSz cx="12192000" cy="10972800"/>
   <p:notesSz cx="6858000" cy="9144000"/>
   <p:defaultTextStyle>
     <a:defPPr>
@@ -104,6 +104,11 @@
       </a:defRPr>
     </a:lvl9pPr>
   </p:defaultTextStyle>
+  <p:extLst>
+    <p:ext uri="{EFAFB233-063F-42B5-8137-9DF3F51BA10A}">
+      <p15:sldGuideLst xmlns:p15="http://schemas.microsoft.com/office/powerpoint/2012/main"/>
+    </p:ext>
+  </p:extLst>
 </p:presentation>
 </file>
 
@@ -136,15 +141,15 @@
         </p:nvSpPr>
         <p:spPr>
           <a:xfrm>
-            <a:off x="1524000" y="1122363"/>
-            <a:ext cx="9144000" cy="2387600"/>
+            <a:off x="914400" y="1795781"/>
+            <a:ext cx="10363200" cy="3820160"/>
           </a:xfrm>
         </p:spPr>
         <p:txBody>
           <a:bodyPr anchor="b"/>
           <a:lstStyle>
             <a:lvl1pPr algn="ctr">
-              <a:defRPr sz="6000"/>
+              <a:defRPr sz="8000"/>
             </a:lvl1pPr>
           </a:lstStyle>
           <a:p>
@@ -152,7 +157,7 @@
               <a:rPr lang="en-US" smtClean="0"/>
               <a:t>Click to edit Master title style</a:t>
             </a:r>
-            <a:endParaRPr lang="en-US"/>
+            <a:endParaRPr lang="en-US" dirty="0"/>
           </a:p>
         </p:txBody>
       </p:sp>
@@ -168,8 +173,8 @@
         </p:nvSpPr>
         <p:spPr>
           <a:xfrm>
-            <a:off x="1524000" y="3602038"/>
-            <a:ext cx="9144000" cy="1655762"/>
+            <a:off x="1524000" y="5763261"/>
+            <a:ext cx="9144000" cy="2649219"/>
           </a:xfrm>
         </p:spPr>
         <p:txBody>
@@ -177,39 +182,39 @@
           <a:lstStyle>
             <a:lvl1pPr marL="0" indent="0" algn="ctr">
               <a:buNone/>
+              <a:defRPr sz="3200"/>
+            </a:lvl1pPr>
+            <a:lvl2pPr marL="609585" indent="0" algn="ctr">
+              <a:buNone/>
+              <a:defRPr sz="2667"/>
+            </a:lvl2pPr>
+            <a:lvl3pPr marL="1219170" indent="0" algn="ctr">
+              <a:buNone/>
               <a:defRPr sz="2400"/>
-            </a:lvl1pPr>
-            <a:lvl2pPr marL="457200" indent="0" algn="ctr">
-              <a:buNone/>
-              <a:defRPr sz="2000"/>
-            </a:lvl2pPr>
-            <a:lvl3pPr marL="914400" indent="0" algn="ctr">
-              <a:buNone/>
-              <a:defRPr sz="1800"/>
             </a:lvl3pPr>
-            <a:lvl4pPr marL="1371600" indent="0" algn="ctr">
-              <a:buNone/>
-              <a:defRPr sz="1600"/>
+            <a:lvl4pPr marL="1828754" indent="0" algn="ctr">
+              <a:buNone/>
+              <a:defRPr sz="2133"/>
             </a:lvl4pPr>
-            <a:lvl5pPr marL="1828800" indent="0" algn="ctr">
-              <a:buNone/>
-              <a:defRPr sz="1600"/>
+            <a:lvl5pPr marL="2438339" indent="0" algn="ctr">
+              <a:buNone/>
+              <a:defRPr sz="2133"/>
             </a:lvl5pPr>
-            <a:lvl6pPr marL="2286000" indent="0" algn="ctr">
-              <a:buNone/>
-              <a:defRPr sz="1600"/>
+            <a:lvl6pPr marL="3047924" indent="0" algn="ctr">
+              <a:buNone/>
+              <a:defRPr sz="2133"/>
             </a:lvl6pPr>
-            <a:lvl7pPr marL="2743200" indent="0" algn="ctr">
-              <a:buNone/>
-              <a:defRPr sz="1600"/>
+            <a:lvl7pPr marL="3657509" indent="0" algn="ctr">
+              <a:buNone/>
+              <a:defRPr sz="2133"/>
             </a:lvl7pPr>
-            <a:lvl8pPr marL="3200400" indent="0" algn="ctr">
-              <a:buNone/>
-              <a:defRPr sz="1600"/>
+            <a:lvl8pPr marL="4267093" indent="0" algn="ctr">
+              <a:buNone/>
+              <a:defRPr sz="2133"/>
             </a:lvl8pPr>
-            <a:lvl9pPr marL="3657600" indent="0" algn="ctr">
-              <a:buNone/>
-              <a:defRPr sz="1600"/>
+            <a:lvl9pPr marL="4876678" indent="0" algn="ctr">
+              <a:buNone/>
+              <a:defRPr sz="2133"/>
             </a:lvl9pPr>
           </a:lstStyle>
           <a:p>
@@ -217,7 +222,7 @@
               <a:rPr lang="en-US" smtClean="0"/>
               <a:t>Click to edit Master subtitle style</a:t>
             </a:r>
-            <a:endParaRPr lang="en-US"/>
+            <a:endParaRPr lang="en-US" dirty="0"/>
           </a:p>
         </p:txBody>
       </p:sp>
@@ -238,7 +243,7 @@
           <a:p>
             <a:fld id="{5786B12B-387C-A54C-8892-E5B3570D7A4E}" type="datetimeFigureOut">
               <a:rPr lang="en-US" smtClean="0"/>
-              <a:t>5/10/19</a:t>
+              <a:t>5/15/19</a:t>
             </a:fld>
             <a:endParaRPr lang="en-US"/>
           </a:p>
@@ -287,11 +292,6 @@
         </p:txBody>
       </p:sp>
     </p:spTree>
-    <p:extLst>
-      <p:ext uri="{BB962C8B-B14F-4D97-AF65-F5344CB8AC3E}">
-        <p14:creationId xmlns:p14="http://schemas.microsoft.com/office/powerpoint/2010/main" val="755550702"/>
-      </p:ext>
-    </p:extLst>
   </p:cSld>
   <p:clrMapOvr>
     <a:masterClrMapping/>
@@ -335,7 +335,7 @@
               <a:rPr lang="en-US" smtClean="0"/>
               <a:t>Click to edit Master title style</a:t>
             </a:r>
-            <a:endParaRPr lang="en-US"/>
+            <a:endParaRPr lang="en-US" dirty="0"/>
           </a:p>
         </p:txBody>
       </p:sp>
@@ -387,7 +387,7 @@
               <a:rPr lang="en-US" smtClean="0"/>
               <a:t>Fifth level</a:t>
             </a:r>
-            <a:endParaRPr lang="en-US"/>
+            <a:endParaRPr lang="en-US" dirty="0"/>
           </a:p>
         </p:txBody>
       </p:sp>
@@ -408,7 +408,7 @@
           <a:p>
             <a:fld id="{5786B12B-387C-A54C-8892-E5B3570D7A4E}" type="datetimeFigureOut">
               <a:rPr lang="en-US" smtClean="0"/>
-              <a:t>5/10/19</a:t>
+              <a:t>5/15/19</a:t>
             </a:fld>
             <a:endParaRPr lang="en-US"/>
           </a:p>
@@ -457,11 +457,6 @@
         </p:txBody>
       </p:sp>
     </p:spTree>
-    <p:extLst>
-      <p:ext uri="{BB962C8B-B14F-4D97-AF65-F5344CB8AC3E}">
-        <p14:creationId xmlns:p14="http://schemas.microsoft.com/office/powerpoint/2010/main" val="635503174"/>
-      </p:ext>
-    </p:extLst>
   </p:cSld>
   <p:clrMapOvr>
     <a:masterClrMapping/>
@@ -498,8 +493,8 @@
         </p:nvSpPr>
         <p:spPr>
           <a:xfrm>
-            <a:off x="8724900" y="365125"/>
-            <a:ext cx="2628900" cy="5811838"/>
+            <a:off x="8724901" y="584200"/>
+            <a:ext cx="2628900" cy="9298941"/>
           </a:xfrm>
         </p:spPr>
         <p:txBody>
@@ -510,7 +505,7 @@
               <a:rPr lang="en-US" smtClean="0"/>
               <a:t>Click to edit Master title style</a:t>
             </a:r>
-            <a:endParaRPr lang="en-US"/>
+            <a:endParaRPr lang="en-US" dirty="0"/>
           </a:p>
         </p:txBody>
       </p:sp>
@@ -526,8 +521,8 @@
         </p:nvSpPr>
         <p:spPr>
           <a:xfrm>
-            <a:off x="838200" y="365125"/>
-            <a:ext cx="7734300" cy="5811838"/>
+            <a:off x="838201" y="584200"/>
+            <a:ext cx="7734300" cy="9298941"/>
           </a:xfrm>
         </p:spPr>
         <p:txBody>
@@ -567,7 +562,7 @@
               <a:rPr lang="en-US" smtClean="0"/>
               <a:t>Fifth level</a:t>
             </a:r>
-            <a:endParaRPr lang="en-US"/>
+            <a:endParaRPr lang="en-US" dirty="0"/>
           </a:p>
         </p:txBody>
       </p:sp>
@@ -588,7 +583,7 @@
           <a:p>
             <a:fld id="{5786B12B-387C-A54C-8892-E5B3570D7A4E}" type="datetimeFigureOut">
               <a:rPr lang="en-US" smtClean="0"/>
-              <a:t>5/10/19</a:t>
+              <a:t>5/15/19</a:t>
             </a:fld>
             <a:endParaRPr lang="en-US"/>
           </a:p>
@@ -637,11 +632,6 @@
         </p:txBody>
       </p:sp>
     </p:spTree>
-    <p:extLst>
-      <p:ext uri="{BB962C8B-B14F-4D97-AF65-F5344CB8AC3E}">
-        <p14:creationId xmlns:p14="http://schemas.microsoft.com/office/powerpoint/2010/main" val="1465668887"/>
-      </p:ext>
-    </p:extLst>
   </p:cSld>
   <p:clrMapOvr>
     <a:masterClrMapping/>
@@ -685,7 +675,7 @@
               <a:rPr lang="en-US" smtClean="0"/>
               <a:t>Click to edit Master title style</a:t>
             </a:r>
-            <a:endParaRPr lang="en-US"/>
+            <a:endParaRPr lang="en-US" dirty="0"/>
           </a:p>
         </p:txBody>
       </p:sp>
@@ -737,7 +727,7 @@
               <a:rPr lang="en-US" smtClean="0"/>
               <a:t>Fifth level</a:t>
             </a:r>
-            <a:endParaRPr lang="en-US"/>
+            <a:endParaRPr lang="en-US" dirty="0"/>
           </a:p>
         </p:txBody>
       </p:sp>
@@ -758,7 +748,7 @@
           <a:p>
             <a:fld id="{5786B12B-387C-A54C-8892-E5B3570D7A4E}" type="datetimeFigureOut">
               <a:rPr lang="en-US" smtClean="0"/>
-              <a:t>5/10/19</a:t>
+              <a:t>5/15/19</a:t>
             </a:fld>
             <a:endParaRPr lang="en-US"/>
           </a:p>
@@ -807,11 +797,6 @@
         </p:txBody>
       </p:sp>
     </p:spTree>
-    <p:extLst>
-      <p:ext uri="{BB962C8B-B14F-4D97-AF65-F5344CB8AC3E}">
-        <p14:creationId xmlns:p14="http://schemas.microsoft.com/office/powerpoint/2010/main" val="469843803"/>
-      </p:ext>
-    </p:extLst>
   </p:cSld>
   <p:clrMapOvr>
     <a:masterClrMapping/>
@@ -848,15 +833,15 @@
         </p:nvSpPr>
         <p:spPr>
           <a:xfrm>
-            <a:off x="831850" y="1709738"/>
-            <a:ext cx="10515600" cy="2852737"/>
+            <a:off x="831851" y="2735583"/>
+            <a:ext cx="10515600" cy="4564379"/>
           </a:xfrm>
         </p:spPr>
         <p:txBody>
           <a:bodyPr anchor="b"/>
           <a:lstStyle>
             <a:lvl1pPr>
-              <a:defRPr sz="6000"/>
+              <a:defRPr sz="8000"/>
             </a:lvl1pPr>
           </a:lstStyle>
           <a:p>
@@ -864,7 +849,7 @@
               <a:rPr lang="en-US" smtClean="0"/>
               <a:t>Click to edit Master title style</a:t>
             </a:r>
-            <a:endParaRPr lang="en-US"/>
+            <a:endParaRPr lang="en-US" dirty="0"/>
           </a:p>
         </p:txBody>
       </p:sp>
@@ -880,14 +865,32 @@
         </p:nvSpPr>
         <p:spPr>
           <a:xfrm>
-            <a:off x="831850" y="4589463"/>
-            <a:ext cx="10515600" cy="1500187"/>
+            <a:off x="831851" y="7343143"/>
+            <a:ext cx="10515600" cy="2400299"/>
           </a:xfrm>
         </p:spPr>
         <p:txBody>
           <a:bodyPr/>
           <a:lstStyle>
             <a:lvl1pPr marL="0" indent="0">
+              <a:buNone/>
+              <a:defRPr sz="3200">
+                <a:solidFill>
+                  <a:schemeClr val="tx1"/>
+                </a:solidFill>
+              </a:defRPr>
+            </a:lvl1pPr>
+            <a:lvl2pPr marL="609585" indent="0">
+              <a:buNone/>
+              <a:defRPr sz="2667">
+                <a:solidFill>
+                  <a:schemeClr val="tx1">
+                    <a:tint val="75000"/>
+                  </a:schemeClr>
+                </a:solidFill>
+              </a:defRPr>
+            </a:lvl2pPr>
+            <a:lvl3pPr marL="1219170" indent="0">
               <a:buNone/>
               <a:defRPr sz="2400">
                 <a:solidFill>
@@ -896,30 +899,10 @@
                   </a:schemeClr>
                 </a:solidFill>
               </a:defRPr>
-            </a:lvl1pPr>
-            <a:lvl2pPr marL="457200" indent="0">
-              <a:buNone/>
-              <a:defRPr sz="2000">
-                <a:solidFill>
-                  <a:schemeClr val="tx1">
-                    <a:tint val="75000"/>
-                  </a:schemeClr>
-                </a:solidFill>
-              </a:defRPr>
-            </a:lvl2pPr>
-            <a:lvl3pPr marL="914400" indent="0">
-              <a:buNone/>
-              <a:defRPr sz="1800">
-                <a:solidFill>
-                  <a:schemeClr val="tx1">
-                    <a:tint val="75000"/>
-                  </a:schemeClr>
-                </a:solidFill>
-              </a:defRPr>
             </a:lvl3pPr>
-            <a:lvl4pPr marL="1371600" indent="0">
-              <a:buNone/>
-              <a:defRPr sz="1600">
+            <a:lvl4pPr marL="1828754" indent="0">
+              <a:buNone/>
+              <a:defRPr sz="2133">
                 <a:solidFill>
                   <a:schemeClr val="tx1">
                     <a:tint val="75000"/>
@@ -927,9 +910,9 @@
                 </a:solidFill>
               </a:defRPr>
             </a:lvl4pPr>
-            <a:lvl5pPr marL="1828800" indent="0">
-              <a:buNone/>
-              <a:defRPr sz="1600">
+            <a:lvl5pPr marL="2438339" indent="0">
+              <a:buNone/>
+              <a:defRPr sz="2133">
                 <a:solidFill>
                   <a:schemeClr val="tx1">
                     <a:tint val="75000"/>
@@ -937,9 +920,9 @@
                 </a:solidFill>
               </a:defRPr>
             </a:lvl5pPr>
-            <a:lvl6pPr marL="2286000" indent="0">
-              <a:buNone/>
-              <a:defRPr sz="1600">
+            <a:lvl6pPr marL="3047924" indent="0">
+              <a:buNone/>
+              <a:defRPr sz="2133">
                 <a:solidFill>
                   <a:schemeClr val="tx1">
                     <a:tint val="75000"/>
@@ -947,9 +930,9 @@
                 </a:solidFill>
               </a:defRPr>
             </a:lvl6pPr>
-            <a:lvl7pPr marL="2743200" indent="0">
-              <a:buNone/>
-              <a:defRPr sz="1600">
+            <a:lvl7pPr marL="3657509" indent="0">
+              <a:buNone/>
+              <a:defRPr sz="2133">
                 <a:solidFill>
                   <a:schemeClr val="tx1">
                     <a:tint val="75000"/>
@@ -957,9 +940,9 @@
                 </a:solidFill>
               </a:defRPr>
             </a:lvl7pPr>
-            <a:lvl8pPr marL="3200400" indent="0">
-              <a:buNone/>
-              <a:defRPr sz="1600">
+            <a:lvl8pPr marL="4267093" indent="0">
+              <a:buNone/>
+              <a:defRPr sz="2133">
                 <a:solidFill>
                   <a:schemeClr val="tx1">
                     <a:tint val="75000"/>
@@ -967,9 +950,9 @@
                 </a:solidFill>
               </a:defRPr>
             </a:lvl8pPr>
-            <a:lvl9pPr marL="3657600" indent="0">
-              <a:buNone/>
-              <a:defRPr sz="1600">
+            <a:lvl9pPr marL="4876678" indent="0">
+              <a:buNone/>
+              <a:defRPr sz="2133">
                 <a:solidFill>
                   <a:schemeClr val="tx1">
                     <a:tint val="75000"/>
@@ -1004,7 +987,7 @@
           <a:p>
             <a:fld id="{5786B12B-387C-A54C-8892-E5B3570D7A4E}" type="datetimeFigureOut">
               <a:rPr lang="en-US" smtClean="0"/>
-              <a:t>5/10/19</a:t>
+              <a:t>5/15/19</a:t>
             </a:fld>
             <a:endParaRPr lang="en-US"/>
           </a:p>
@@ -1053,11 +1036,6 @@
         </p:txBody>
       </p:sp>
     </p:spTree>
-    <p:extLst>
-      <p:ext uri="{BB962C8B-B14F-4D97-AF65-F5344CB8AC3E}">
-        <p14:creationId xmlns:p14="http://schemas.microsoft.com/office/powerpoint/2010/main" val="367427002"/>
-      </p:ext>
-    </p:extLst>
   </p:cSld>
   <p:clrMapOvr>
     <a:masterClrMapping/>
@@ -1101,7 +1079,7 @@
               <a:rPr lang="en-US" smtClean="0"/>
               <a:t>Click to edit Master title style</a:t>
             </a:r>
-            <a:endParaRPr lang="en-US"/>
+            <a:endParaRPr lang="en-US" dirty="0"/>
           </a:p>
         </p:txBody>
       </p:sp>
@@ -1117,8 +1095,8 @@
         </p:nvSpPr>
         <p:spPr>
           <a:xfrm>
-            <a:off x="838200" y="1825625"/>
-            <a:ext cx="5181600" cy="4351338"/>
+            <a:off x="838200" y="2921000"/>
+            <a:ext cx="5181600" cy="6962141"/>
           </a:xfrm>
         </p:spPr>
         <p:txBody>
@@ -1158,7 +1136,7 @@
               <a:rPr lang="en-US" smtClean="0"/>
               <a:t>Fifth level</a:t>
             </a:r>
-            <a:endParaRPr lang="en-US"/>
+            <a:endParaRPr lang="en-US" dirty="0"/>
           </a:p>
         </p:txBody>
       </p:sp>
@@ -1174,8 +1152,8 @@
         </p:nvSpPr>
         <p:spPr>
           <a:xfrm>
-            <a:off x="6172200" y="1825625"/>
-            <a:ext cx="5181600" cy="4351338"/>
+            <a:off x="6172200" y="2921000"/>
+            <a:ext cx="5181600" cy="6962141"/>
           </a:xfrm>
         </p:spPr>
         <p:txBody>
@@ -1215,7 +1193,7 @@
               <a:rPr lang="en-US" smtClean="0"/>
               <a:t>Fifth level</a:t>
             </a:r>
-            <a:endParaRPr lang="en-US"/>
+            <a:endParaRPr lang="en-US" dirty="0"/>
           </a:p>
         </p:txBody>
       </p:sp>
@@ -1236,7 +1214,7 @@
           <a:p>
             <a:fld id="{5786B12B-387C-A54C-8892-E5B3570D7A4E}" type="datetimeFigureOut">
               <a:rPr lang="en-US" smtClean="0"/>
-              <a:t>5/10/19</a:t>
+              <a:t>5/15/19</a:t>
             </a:fld>
             <a:endParaRPr lang="en-US"/>
           </a:p>
@@ -1285,11 +1263,6 @@
         </p:txBody>
       </p:sp>
     </p:spTree>
-    <p:extLst>
-      <p:ext uri="{BB962C8B-B14F-4D97-AF65-F5344CB8AC3E}">
-        <p14:creationId xmlns:p14="http://schemas.microsoft.com/office/powerpoint/2010/main" val="1330137489"/>
-      </p:ext>
-    </p:extLst>
   </p:cSld>
   <p:clrMapOvr>
     <a:masterClrMapping/>
@@ -1326,8 +1299,8 @@
         </p:nvSpPr>
         <p:spPr>
           <a:xfrm>
-            <a:off x="839788" y="365125"/>
-            <a:ext cx="10515600" cy="1325563"/>
+            <a:off x="839788" y="584202"/>
+            <a:ext cx="10515600" cy="2120901"/>
           </a:xfrm>
         </p:spPr>
         <p:txBody>
@@ -1338,7 +1311,7 @@
               <a:rPr lang="en-US" smtClean="0"/>
               <a:t>Click to edit Master title style</a:t>
             </a:r>
-            <a:endParaRPr lang="en-US"/>
+            <a:endParaRPr lang="en-US" dirty="0"/>
           </a:p>
         </p:txBody>
       </p:sp>
@@ -1354,8 +1327,8 @@
         </p:nvSpPr>
         <p:spPr>
           <a:xfrm>
-            <a:off x="839788" y="1681163"/>
-            <a:ext cx="5157787" cy="823912"/>
+            <a:off x="839789" y="2689861"/>
+            <a:ext cx="5157787" cy="1318259"/>
           </a:xfrm>
         </p:spPr>
         <p:txBody>
@@ -1363,39 +1336,39 @@
           <a:lstStyle>
             <a:lvl1pPr marL="0" indent="0">
               <a:buNone/>
+              <a:defRPr sz="3200" b="1"/>
+            </a:lvl1pPr>
+            <a:lvl2pPr marL="609585" indent="0">
+              <a:buNone/>
+              <a:defRPr sz="2667" b="1"/>
+            </a:lvl2pPr>
+            <a:lvl3pPr marL="1219170" indent="0">
+              <a:buNone/>
               <a:defRPr sz="2400" b="1"/>
-            </a:lvl1pPr>
-            <a:lvl2pPr marL="457200" indent="0">
-              <a:buNone/>
-              <a:defRPr sz="2000" b="1"/>
-            </a:lvl2pPr>
-            <a:lvl3pPr marL="914400" indent="0">
-              <a:buNone/>
-              <a:defRPr sz="1800" b="1"/>
             </a:lvl3pPr>
-            <a:lvl4pPr marL="1371600" indent="0">
-              <a:buNone/>
-              <a:defRPr sz="1600" b="1"/>
+            <a:lvl4pPr marL="1828754" indent="0">
+              <a:buNone/>
+              <a:defRPr sz="2133" b="1"/>
             </a:lvl4pPr>
-            <a:lvl5pPr marL="1828800" indent="0">
-              <a:buNone/>
-              <a:defRPr sz="1600" b="1"/>
+            <a:lvl5pPr marL="2438339" indent="0">
+              <a:buNone/>
+              <a:defRPr sz="2133" b="1"/>
             </a:lvl5pPr>
-            <a:lvl6pPr marL="2286000" indent="0">
-              <a:buNone/>
-              <a:defRPr sz="1600" b="1"/>
+            <a:lvl6pPr marL="3047924" indent="0">
+              <a:buNone/>
+              <a:defRPr sz="2133" b="1"/>
             </a:lvl6pPr>
-            <a:lvl7pPr marL="2743200" indent="0">
-              <a:buNone/>
-              <a:defRPr sz="1600" b="1"/>
+            <a:lvl7pPr marL="3657509" indent="0">
+              <a:buNone/>
+              <a:defRPr sz="2133" b="1"/>
             </a:lvl7pPr>
-            <a:lvl8pPr marL="3200400" indent="0">
-              <a:buNone/>
-              <a:defRPr sz="1600" b="1"/>
+            <a:lvl8pPr marL="4267093" indent="0">
+              <a:buNone/>
+              <a:defRPr sz="2133" b="1"/>
             </a:lvl8pPr>
-            <a:lvl9pPr marL="3657600" indent="0">
-              <a:buNone/>
-              <a:defRPr sz="1600" b="1"/>
+            <a:lvl9pPr marL="4876678" indent="0">
+              <a:buNone/>
+              <a:defRPr sz="2133" b="1"/>
             </a:lvl9pPr>
           </a:lstStyle>
           <a:p>
@@ -1419,8 +1392,8 @@
         </p:nvSpPr>
         <p:spPr>
           <a:xfrm>
-            <a:off x="839788" y="2505075"/>
-            <a:ext cx="5157787" cy="3684588"/>
+            <a:off x="839789" y="4008120"/>
+            <a:ext cx="5157787" cy="5895341"/>
           </a:xfrm>
         </p:spPr>
         <p:txBody>
@@ -1460,7 +1433,7 @@
               <a:rPr lang="en-US" smtClean="0"/>
               <a:t>Fifth level</a:t>
             </a:r>
-            <a:endParaRPr lang="en-US"/>
+            <a:endParaRPr lang="en-US" dirty="0"/>
           </a:p>
         </p:txBody>
       </p:sp>
@@ -1476,8 +1449,8 @@
         </p:nvSpPr>
         <p:spPr>
           <a:xfrm>
-            <a:off x="6172200" y="1681163"/>
-            <a:ext cx="5183188" cy="823912"/>
+            <a:off x="6172201" y="2689861"/>
+            <a:ext cx="5183188" cy="1318259"/>
           </a:xfrm>
         </p:spPr>
         <p:txBody>
@@ -1485,39 +1458,39 @@
           <a:lstStyle>
             <a:lvl1pPr marL="0" indent="0">
               <a:buNone/>
+              <a:defRPr sz="3200" b="1"/>
+            </a:lvl1pPr>
+            <a:lvl2pPr marL="609585" indent="0">
+              <a:buNone/>
+              <a:defRPr sz="2667" b="1"/>
+            </a:lvl2pPr>
+            <a:lvl3pPr marL="1219170" indent="0">
+              <a:buNone/>
               <a:defRPr sz="2400" b="1"/>
-            </a:lvl1pPr>
-            <a:lvl2pPr marL="457200" indent="0">
-              <a:buNone/>
-              <a:defRPr sz="2000" b="1"/>
-            </a:lvl2pPr>
-            <a:lvl3pPr marL="914400" indent="0">
-              <a:buNone/>
-              <a:defRPr sz="1800" b="1"/>
             </a:lvl3pPr>
-            <a:lvl4pPr marL="1371600" indent="0">
-              <a:buNone/>
-              <a:defRPr sz="1600" b="1"/>
+            <a:lvl4pPr marL="1828754" indent="0">
+              <a:buNone/>
+              <a:defRPr sz="2133" b="1"/>
             </a:lvl4pPr>
-            <a:lvl5pPr marL="1828800" indent="0">
-              <a:buNone/>
-              <a:defRPr sz="1600" b="1"/>
+            <a:lvl5pPr marL="2438339" indent="0">
+              <a:buNone/>
+              <a:defRPr sz="2133" b="1"/>
             </a:lvl5pPr>
-            <a:lvl6pPr marL="2286000" indent="0">
-              <a:buNone/>
-              <a:defRPr sz="1600" b="1"/>
+            <a:lvl6pPr marL="3047924" indent="0">
+              <a:buNone/>
+              <a:defRPr sz="2133" b="1"/>
             </a:lvl6pPr>
-            <a:lvl7pPr marL="2743200" indent="0">
-              <a:buNone/>
-              <a:defRPr sz="1600" b="1"/>
+            <a:lvl7pPr marL="3657509" indent="0">
+              <a:buNone/>
+              <a:defRPr sz="2133" b="1"/>
             </a:lvl7pPr>
-            <a:lvl8pPr marL="3200400" indent="0">
-              <a:buNone/>
-              <a:defRPr sz="1600" b="1"/>
+            <a:lvl8pPr marL="4267093" indent="0">
+              <a:buNone/>
+              <a:defRPr sz="2133" b="1"/>
             </a:lvl8pPr>
-            <a:lvl9pPr marL="3657600" indent="0">
-              <a:buNone/>
-              <a:defRPr sz="1600" b="1"/>
+            <a:lvl9pPr marL="4876678" indent="0">
+              <a:buNone/>
+              <a:defRPr sz="2133" b="1"/>
             </a:lvl9pPr>
           </a:lstStyle>
           <a:p>
@@ -1541,8 +1514,8 @@
         </p:nvSpPr>
         <p:spPr>
           <a:xfrm>
-            <a:off x="6172200" y="2505075"/>
-            <a:ext cx="5183188" cy="3684588"/>
+            <a:off x="6172201" y="4008120"/>
+            <a:ext cx="5183188" cy="5895341"/>
           </a:xfrm>
         </p:spPr>
         <p:txBody>
@@ -1582,7 +1555,7 @@
               <a:rPr lang="en-US" smtClean="0"/>
               <a:t>Fifth level</a:t>
             </a:r>
-            <a:endParaRPr lang="en-US"/>
+            <a:endParaRPr lang="en-US" dirty="0"/>
           </a:p>
         </p:txBody>
       </p:sp>
@@ -1603,7 +1576,7 @@
           <a:p>
             <a:fld id="{5786B12B-387C-A54C-8892-E5B3570D7A4E}" type="datetimeFigureOut">
               <a:rPr lang="en-US" smtClean="0"/>
-              <a:t>5/10/19</a:t>
+              <a:t>5/15/19</a:t>
             </a:fld>
             <a:endParaRPr lang="en-US"/>
           </a:p>
@@ -1652,11 +1625,6 @@
         </p:txBody>
       </p:sp>
     </p:spTree>
-    <p:extLst>
-      <p:ext uri="{BB962C8B-B14F-4D97-AF65-F5344CB8AC3E}">
-        <p14:creationId xmlns:p14="http://schemas.microsoft.com/office/powerpoint/2010/main" val="316012353"/>
-      </p:ext>
-    </p:extLst>
   </p:cSld>
   <p:clrMapOvr>
     <a:masterClrMapping/>
@@ -1700,7 +1668,7 @@
               <a:rPr lang="en-US" smtClean="0"/>
               <a:t>Click to edit Master title style</a:t>
             </a:r>
-            <a:endParaRPr lang="en-US"/>
+            <a:endParaRPr lang="en-US" dirty="0"/>
           </a:p>
         </p:txBody>
       </p:sp>
@@ -1721,7 +1689,7 @@
           <a:p>
             <a:fld id="{5786B12B-387C-A54C-8892-E5B3570D7A4E}" type="datetimeFigureOut">
               <a:rPr lang="en-US" smtClean="0"/>
-              <a:t>5/10/19</a:t>
+              <a:t>5/15/19</a:t>
             </a:fld>
             <a:endParaRPr lang="en-US"/>
           </a:p>
@@ -1770,11 +1738,6 @@
         </p:txBody>
       </p:sp>
     </p:spTree>
-    <p:extLst>
-      <p:ext uri="{BB962C8B-B14F-4D97-AF65-F5344CB8AC3E}">
-        <p14:creationId xmlns:p14="http://schemas.microsoft.com/office/powerpoint/2010/main" val="492557840"/>
-      </p:ext>
-    </p:extLst>
   </p:cSld>
   <p:clrMapOvr>
     <a:masterClrMapping/>
@@ -1816,7 +1779,7 @@
           <a:p>
             <a:fld id="{5786B12B-387C-A54C-8892-E5B3570D7A4E}" type="datetimeFigureOut">
               <a:rPr lang="en-US" smtClean="0"/>
-              <a:t>5/10/19</a:t>
+              <a:t>5/15/19</a:t>
             </a:fld>
             <a:endParaRPr lang="en-US"/>
           </a:p>
@@ -1865,11 +1828,6 @@
         </p:txBody>
       </p:sp>
     </p:spTree>
-    <p:extLst>
-      <p:ext uri="{BB962C8B-B14F-4D97-AF65-F5344CB8AC3E}">
-        <p14:creationId xmlns:p14="http://schemas.microsoft.com/office/powerpoint/2010/main" val="2017641342"/>
-      </p:ext>
-    </p:extLst>
   </p:cSld>
   <p:clrMapOvr>
     <a:masterClrMapping/>
@@ -1906,15 +1864,15 @@
         </p:nvSpPr>
         <p:spPr>
           <a:xfrm>
-            <a:off x="839788" y="457200"/>
-            <a:ext cx="3932237" cy="1600200"/>
+            <a:off x="839788" y="731520"/>
+            <a:ext cx="3932237" cy="2560320"/>
           </a:xfrm>
         </p:spPr>
         <p:txBody>
           <a:bodyPr anchor="b"/>
           <a:lstStyle>
             <a:lvl1pPr>
-              <a:defRPr sz="3200"/>
+              <a:defRPr sz="4267"/>
             </a:lvl1pPr>
           </a:lstStyle>
           <a:p>
@@ -1922,7 +1880,7 @@
               <a:rPr lang="en-US" smtClean="0"/>
               <a:t>Click to edit Master title style</a:t>
             </a:r>
-            <a:endParaRPr lang="en-US"/>
+            <a:endParaRPr lang="en-US" dirty="0"/>
           </a:p>
         </p:txBody>
       </p:sp>
@@ -1938,39 +1896,39 @@
         </p:nvSpPr>
         <p:spPr>
           <a:xfrm>
-            <a:off x="5183188" y="987425"/>
-            <a:ext cx="6172200" cy="4873625"/>
+            <a:off x="5183188" y="1579882"/>
+            <a:ext cx="6172200" cy="7797800"/>
           </a:xfrm>
         </p:spPr>
         <p:txBody>
           <a:bodyPr/>
           <a:lstStyle>
             <a:lvl1pPr>
-              <a:defRPr sz="3200"/>
+              <a:defRPr sz="4267"/>
             </a:lvl1pPr>
             <a:lvl2pPr>
-              <a:defRPr sz="2800"/>
+              <a:defRPr sz="3733"/>
             </a:lvl2pPr>
             <a:lvl3pPr>
-              <a:defRPr sz="2400"/>
+              <a:defRPr sz="3200"/>
             </a:lvl3pPr>
             <a:lvl4pPr>
-              <a:defRPr sz="2000"/>
+              <a:defRPr sz="2667"/>
             </a:lvl4pPr>
             <a:lvl5pPr>
-              <a:defRPr sz="2000"/>
+              <a:defRPr sz="2667"/>
             </a:lvl5pPr>
             <a:lvl6pPr>
-              <a:defRPr sz="2000"/>
+              <a:defRPr sz="2667"/>
             </a:lvl6pPr>
             <a:lvl7pPr>
-              <a:defRPr sz="2000"/>
+              <a:defRPr sz="2667"/>
             </a:lvl7pPr>
             <a:lvl8pPr>
-              <a:defRPr sz="2000"/>
+              <a:defRPr sz="2667"/>
             </a:lvl8pPr>
             <a:lvl9pPr>
-              <a:defRPr sz="2000"/>
+              <a:defRPr sz="2667"/>
             </a:lvl9pPr>
           </a:lstStyle>
           <a:p>
@@ -2007,7 +1965,7 @@
               <a:rPr lang="en-US" smtClean="0"/>
               <a:t>Fifth level</a:t>
             </a:r>
-            <a:endParaRPr lang="en-US"/>
+            <a:endParaRPr lang="en-US" dirty="0"/>
           </a:p>
         </p:txBody>
       </p:sp>
@@ -2023,8 +1981,8 @@
         </p:nvSpPr>
         <p:spPr>
           <a:xfrm>
-            <a:off x="839788" y="2057400"/>
-            <a:ext cx="3932237" cy="3811588"/>
+            <a:off x="839788" y="3291840"/>
+            <a:ext cx="3932237" cy="6098541"/>
           </a:xfrm>
         </p:spPr>
         <p:txBody>
@@ -2032,39 +1990,39 @@
           <a:lstStyle>
             <a:lvl1pPr marL="0" indent="0">
               <a:buNone/>
+              <a:defRPr sz="2133"/>
+            </a:lvl1pPr>
+            <a:lvl2pPr marL="609585" indent="0">
+              <a:buNone/>
+              <a:defRPr sz="1867"/>
+            </a:lvl2pPr>
+            <a:lvl3pPr marL="1219170" indent="0">
+              <a:buNone/>
               <a:defRPr sz="1600"/>
-            </a:lvl1pPr>
-            <a:lvl2pPr marL="457200" indent="0">
-              <a:buNone/>
-              <a:defRPr sz="1400"/>
-            </a:lvl2pPr>
-            <a:lvl3pPr marL="914400" indent="0">
-              <a:buNone/>
-              <a:defRPr sz="1200"/>
             </a:lvl3pPr>
-            <a:lvl4pPr marL="1371600" indent="0">
-              <a:buNone/>
-              <a:defRPr sz="1000"/>
+            <a:lvl4pPr marL="1828754" indent="0">
+              <a:buNone/>
+              <a:defRPr sz="1333"/>
             </a:lvl4pPr>
-            <a:lvl5pPr marL="1828800" indent="0">
-              <a:buNone/>
-              <a:defRPr sz="1000"/>
+            <a:lvl5pPr marL="2438339" indent="0">
+              <a:buNone/>
+              <a:defRPr sz="1333"/>
             </a:lvl5pPr>
-            <a:lvl6pPr marL="2286000" indent="0">
-              <a:buNone/>
-              <a:defRPr sz="1000"/>
+            <a:lvl6pPr marL="3047924" indent="0">
+              <a:buNone/>
+              <a:defRPr sz="1333"/>
             </a:lvl6pPr>
-            <a:lvl7pPr marL="2743200" indent="0">
-              <a:buNone/>
-              <a:defRPr sz="1000"/>
+            <a:lvl7pPr marL="3657509" indent="0">
+              <a:buNone/>
+              <a:defRPr sz="1333"/>
             </a:lvl7pPr>
-            <a:lvl8pPr marL="3200400" indent="0">
-              <a:buNone/>
-              <a:defRPr sz="1000"/>
+            <a:lvl8pPr marL="4267093" indent="0">
+              <a:buNone/>
+              <a:defRPr sz="1333"/>
             </a:lvl8pPr>
-            <a:lvl9pPr marL="3657600" indent="0">
-              <a:buNone/>
-              <a:defRPr sz="1000"/>
+            <a:lvl9pPr marL="4876678" indent="0">
+              <a:buNone/>
+              <a:defRPr sz="1333"/>
             </a:lvl9pPr>
           </a:lstStyle>
           <a:p>
@@ -2093,7 +2051,7 @@
           <a:p>
             <a:fld id="{5786B12B-387C-A54C-8892-E5B3570D7A4E}" type="datetimeFigureOut">
               <a:rPr lang="en-US" smtClean="0"/>
-              <a:t>5/10/19</a:t>
+              <a:t>5/15/19</a:t>
             </a:fld>
             <a:endParaRPr lang="en-US"/>
           </a:p>
@@ -2142,11 +2100,6 @@
         </p:txBody>
       </p:sp>
     </p:spTree>
-    <p:extLst>
-      <p:ext uri="{BB962C8B-B14F-4D97-AF65-F5344CB8AC3E}">
-        <p14:creationId xmlns:p14="http://schemas.microsoft.com/office/powerpoint/2010/main" val="1731248864"/>
-      </p:ext>
-    </p:extLst>
   </p:cSld>
   <p:clrMapOvr>
     <a:masterClrMapping/>
@@ -2183,15 +2136,15 @@
         </p:nvSpPr>
         <p:spPr>
           <a:xfrm>
-            <a:off x="839788" y="457200"/>
-            <a:ext cx="3932237" cy="1600200"/>
+            <a:off x="839788" y="731520"/>
+            <a:ext cx="3932237" cy="2560320"/>
           </a:xfrm>
         </p:spPr>
         <p:txBody>
           <a:bodyPr anchor="b"/>
           <a:lstStyle>
             <a:lvl1pPr>
-              <a:defRPr sz="3200"/>
+              <a:defRPr sz="4267"/>
             </a:lvl1pPr>
           </a:lstStyle>
           <a:p>
@@ -2199,7 +2152,7 @@
               <a:rPr lang="en-US" smtClean="0"/>
               <a:t>Click to edit Master title style</a:t>
             </a:r>
-            <a:endParaRPr lang="en-US"/>
+            <a:endParaRPr lang="en-US" dirty="0"/>
           </a:p>
         </p:txBody>
       </p:sp>
@@ -2207,7 +2160,7 @@
         <p:nvSpPr>
           <p:cNvPr id="3" name="Picture Placeholder 2"/>
           <p:cNvSpPr>
-            <a:spLocks noGrp="1"/>
+            <a:spLocks noGrp="1" noChangeAspect="1"/>
           </p:cNvSpPr>
           <p:nvPr>
             <p:ph type="pic" idx="1"/>
@@ -2215,52 +2168,56 @@
         </p:nvSpPr>
         <p:spPr>
           <a:xfrm>
-            <a:off x="5183188" y="987425"/>
-            <a:ext cx="6172200" cy="4873625"/>
+            <a:off x="5183188" y="1579882"/>
+            <a:ext cx="6172200" cy="7797800"/>
           </a:xfrm>
         </p:spPr>
         <p:txBody>
-          <a:bodyPr/>
+          <a:bodyPr anchor="t"/>
           <a:lstStyle>
             <a:lvl1pPr marL="0" indent="0">
               <a:buNone/>
+              <a:defRPr sz="4267"/>
+            </a:lvl1pPr>
+            <a:lvl2pPr marL="609585" indent="0">
+              <a:buNone/>
+              <a:defRPr sz="3733"/>
+            </a:lvl2pPr>
+            <a:lvl3pPr marL="1219170" indent="0">
+              <a:buNone/>
               <a:defRPr sz="3200"/>
-            </a:lvl1pPr>
-            <a:lvl2pPr marL="457200" indent="0">
-              <a:buNone/>
-              <a:defRPr sz="2800"/>
-            </a:lvl2pPr>
-            <a:lvl3pPr marL="914400" indent="0">
-              <a:buNone/>
-              <a:defRPr sz="2400"/>
             </a:lvl3pPr>
-            <a:lvl4pPr marL="1371600" indent="0">
-              <a:buNone/>
-              <a:defRPr sz="2000"/>
+            <a:lvl4pPr marL="1828754" indent="0">
+              <a:buNone/>
+              <a:defRPr sz="2667"/>
             </a:lvl4pPr>
-            <a:lvl5pPr marL="1828800" indent="0">
-              <a:buNone/>
-              <a:defRPr sz="2000"/>
+            <a:lvl5pPr marL="2438339" indent="0">
+              <a:buNone/>
+              <a:defRPr sz="2667"/>
             </a:lvl5pPr>
-            <a:lvl6pPr marL="2286000" indent="0">
-              <a:buNone/>
-              <a:defRPr sz="2000"/>
+            <a:lvl6pPr marL="3047924" indent="0">
+              <a:buNone/>
+              <a:defRPr sz="2667"/>
             </a:lvl6pPr>
-            <a:lvl7pPr marL="2743200" indent="0">
-              <a:buNone/>
-              <a:defRPr sz="2000"/>
+            <a:lvl7pPr marL="3657509" indent="0">
+              <a:buNone/>
+              <a:defRPr sz="2667"/>
             </a:lvl7pPr>
-            <a:lvl8pPr marL="3200400" indent="0">
-              <a:buNone/>
-              <a:defRPr sz="2000"/>
+            <a:lvl8pPr marL="4267093" indent="0">
+              <a:buNone/>
+              <a:defRPr sz="2667"/>
             </a:lvl8pPr>
-            <a:lvl9pPr marL="3657600" indent="0">
-              <a:buNone/>
-              <a:defRPr sz="2000"/>
+            <a:lvl9pPr marL="4876678" indent="0">
+              <a:buNone/>
+              <a:defRPr sz="2667"/>
             </a:lvl9pPr>
           </a:lstStyle>
           <a:p>
-            <a:endParaRPr lang="en-US"/>
+            <a:r>
+              <a:rPr lang="en-US" smtClean="0"/>
+              <a:t>Drag picture to placeholder or click icon to add</a:t>
+            </a:r>
+            <a:endParaRPr lang="en-US" dirty="0"/>
           </a:p>
         </p:txBody>
       </p:sp>
@@ -2276,8 +2233,8 @@
         </p:nvSpPr>
         <p:spPr>
           <a:xfrm>
-            <a:off x="839788" y="2057400"/>
-            <a:ext cx="3932237" cy="3811588"/>
+            <a:off x="839788" y="3291840"/>
+            <a:ext cx="3932237" cy="6098541"/>
           </a:xfrm>
         </p:spPr>
         <p:txBody>
@@ -2285,39 +2242,39 @@
           <a:lstStyle>
             <a:lvl1pPr marL="0" indent="0">
               <a:buNone/>
+              <a:defRPr sz="2133"/>
+            </a:lvl1pPr>
+            <a:lvl2pPr marL="609585" indent="0">
+              <a:buNone/>
+              <a:defRPr sz="1867"/>
+            </a:lvl2pPr>
+            <a:lvl3pPr marL="1219170" indent="0">
+              <a:buNone/>
               <a:defRPr sz="1600"/>
-            </a:lvl1pPr>
-            <a:lvl2pPr marL="457200" indent="0">
-              <a:buNone/>
-              <a:defRPr sz="1400"/>
-            </a:lvl2pPr>
-            <a:lvl3pPr marL="914400" indent="0">
-              <a:buNone/>
-              <a:defRPr sz="1200"/>
             </a:lvl3pPr>
-            <a:lvl4pPr marL="1371600" indent="0">
-              <a:buNone/>
-              <a:defRPr sz="1000"/>
+            <a:lvl4pPr marL="1828754" indent="0">
+              <a:buNone/>
+              <a:defRPr sz="1333"/>
             </a:lvl4pPr>
-            <a:lvl5pPr marL="1828800" indent="0">
-              <a:buNone/>
-              <a:defRPr sz="1000"/>
+            <a:lvl5pPr marL="2438339" indent="0">
+              <a:buNone/>
+              <a:defRPr sz="1333"/>
             </a:lvl5pPr>
-            <a:lvl6pPr marL="2286000" indent="0">
-              <a:buNone/>
-              <a:defRPr sz="1000"/>
+            <a:lvl6pPr marL="3047924" indent="0">
+              <a:buNone/>
+              <a:defRPr sz="1333"/>
             </a:lvl6pPr>
-            <a:lvl7pPr marL="2743200" indent="0">
-              <a:buNone/>
-              <a:defRPr sz="1000"/>
+            <a:lvl7pPr marL="3657509" indent="0">
+              <a:buNone/>
+              <a:defRPr sz="1333"/>
             </a:lvl7pPr>
-            <a:lvl8pPr marL="3200400" indent="0">
-              <a:buNone/>
-              <a:defRPr sz="1000"/>
+            <a:lvl8pPr marL="4267093" indent="0">
+              <a:buNone/>
+              <a:defRPr sz="1333"/>
             </a:lvl8pPr>
-            <a:lvl9pPr marL="3657600" indent="0">
-              <a:buNone/>
-              <a:defRPr sz="1000"/>
+            <a:lvl9pPr marL="4876678" indent="0">
+              <a:buNone/>
+              <a:defRPr sz="1333"/>
             </a:lvl9pPr>
           </a:lstStyle>
           <a:p>
@@ -2346,7 +2303,7 @@
           <a:p>
             <a:fld id="{5786B12B-387C-A54C-8892-E5B3570D7A4E}" type="datetimeFigureOut">
               <a:rPr lang="en-US" smtClean="0"/>
-              <a:t>5/10/19</a:t>
+              <a:t>5/15/19</a:t>
             </a:fld>
             <a:endParaRPr lang="en-US"/>
           </a:p>
@@ -2395,11 +2352,6 @@
         </p:txBody>
       </p:sp>
     </p:spTree>
-    <p:extLst>
-      <p:ext uri="{BB962C8B-B14F-4D97-AF65-F5344CB8AC3E}">
-        <p14:creationId xmlns:p14="http://schemas.microsoft.com/office/powerpoint/2010/main" val="843724045"/>
-      </p:ext>
-    </p:extLst>
   </p:cSld>
   <p:clrMapOvr>
     <a:masterClrMapping/>
@@ -2441,8 +2393,8 @@
         </p:nvSpPr>
         <p:spPr>
           <a:xfrm>
-            <a:off x="838200" y="365125"/>
-            <a:ext cx="10515600" cy="1325563"/>
+            <a:off x="838200" y="584202"/>
+            <a:ext cx="10515600" cy="2120901"/>
           </a:xfrm>
           <a:prstGeom prst="rect">
             <a:avLst/>
@@ -2458,7 +2410,7 @@
               <a:rPr lang="en-US" smtClean="0"/>
               <a:t>Click to edit Master title style</a:t>
             </a:r>
-            <a:endParaRPr lang="en-US"/>
+            <a:endParaRPr lang="en-US" dirty="0"/>
           </a:p>
         </p:txBody>
       </p:sp>
@@ -2474,8 +2426,8 @@
         </p:nvSpPr>
         <p:spPr>
           <a:xfrm>
-            <a:off x="838200" y="1825625"/>
-            <a:ext cx="10515600" cy="4351338"/>
+            <a:off x="838200" y="2921000"/>
+            <a:ext cx="10515600" cy="6962141"/>
           </a:xfrm>
           <a:prstGeom prst="rect">
             <a:avLst/>
@@ -2520,7 +2472,7 @@
               <a:rPr lang="en-US" smtClean="0"/>
               <a:t>Fifth level</a:t>
             </a:r>
-            <a:endParaRPr lang="en-US"/>
+            <a:endParaRPr lang="en-US" dirty="0"/>
           </a:p>
         </p:txBody>
       </p:sp>
@@ -2536,8 +2488,8 @@
         </p:nvSpPr>
         <p:spPr>
           <a:xfrm>
-            <a:off x="838200" y="6356350"/>
-            <a:ext cx="2743200" cy="365125"/>
+            <a:off x="838200" y="10170162"/>
+            <a:ext cx="2743200" cy="584200"/>
           </a:xfrm>
           <a:prstGeom prst="rect">
             <a:avLst/>
@@ -2547,7 +2499,7 @@
           <a:bodyPr vert="horz" lIns="91440" tIns="45720" rIns="91440" bIns="45720" rtlCol="0" anchor="ctr"/>
           <a:lstStyle>
             <a:lvl1pPr algn="l">
-              <a:defRPr sz="1200">
+              <a:defRPr sz="1600">
                 <a:solidFill>
                   <a:schemeClr val="tx1">
                     <a:tint val="75000"/>
@@ -2559,7 +2511,7 @@
           <a:p>
             <a:fld id="{5786B12B-387C-A54C-8892-E5B3570D7A4E}" type="datetimeFigureOut">
               <a:rPr lang="en-US" smtClean="0"/>
-              <a:t>5/10/19</a:t>
+              <a:t>5/15/19</a:t>
             </a:fld>
             <a:endParaRPr lang="en-US"/>
           </a:p>
@@ -2577,8 +2529,8 @@
         </p:nvSpPr>
         <p:spPr>
           <a:xfrm>
-            <a:off x="4038600" y="6356350"/>
-            <a:ext cx="4114800" cy="365125"/>
+            <a:off x="4038600" y="10170162"/>
+            <a:ext cx="4114800" cy="584200"/>
           </a:xfrm>
           <a:prstGeom prst="rect">
             <a:avLst/>
@@ -2588,7 +2540,7 @@
           <a:bodyPr vert="horz" lIns="91440" tIns="45720" rIns="91440" bIns="45720" rtlCol="0" anchor="ctr"/>
           <a:lstStyle>
             <a:lvl1pPr algn="ctr">
-              <a:defRPr sz="1200">
+              <a:defRPr sz="1600">
                 <a:solidFill>
                   <a:schemeClr val="tx1">
                     <a:tint val="75000"/>
@@ -2614,8 +2566,8 @@
         </p:nvSpPr>
         <p:spPr>
           <a:xfrm>
-            <a:off x="8610600" y="6356350"/>
-            <a:ext cx="2743200" cy="365125"/>
+            <a:off x="8610600" y="10170162"/>
+            <a:ext cx="2743200" cy="584200"/>
           </a:xfrm>
           <a:prstGeom prst="rect">
             <a:avLst/>
@@ -2625,7 +2577,7 @@
           <a:bodyPr vert="horz" lIns="91440" tIns="45720" rIns="91440" bIns="45720" rtlCol="0" anchor="ctr"/>
           <a:lstStyle>
             <a:lvl1pPr algn="r">
-              <a:defRPr sz="1200">
+              <a:defRPr sz="1600">
                 <a:solidFill>
                   <a:schemeClr val="tx1">
                     <a:tint val="75000"/>
@@ -2646,27 +2598,27 @@
     </p:spTree>
     <p:extLst>
       <p:ext uri="{BB962C8B-B14F-4D97-AF65-F5344CB8AC3E}">
-        <p14:creationId xmlns:p14="http://schemas.microsoft.com/office/powerpoint/2010/main" val="296478706"/>
+        <p14:creationId xmlns:p14="http://schemas.microsoft.com/office/powerpoint/2010/main" val="1047750149"/>
       </p:ext>
     </p:extLst>
   </p:cSld>
   <p:clrMap bg1="lt1" tx1="dk1" bg2="lt2" tx2="dk2" accent1="accent1" accent2="accent2" accent3="accent3" accent4="accent4" accent5="accent5" accent6="accent6" hlink="hlink" folHlink="folHlink"/>
   <p:sldLayoutIdLst>
-    <p:sldLayoutId id="2147483649" r:id="rId1"/>
-    <p:sldLayoutId id="2147483650" r:id="rId2"/>
-    <p:sldLayoutId id="2147483651" r:id="rId3"/>
-    <p:sldLayoutId id="2147483652" r:id="rId4"/>
-    <p:sldLayoutId id="2147483653" r:id="rId5"/>
-    <p:sldLayoutId id="2147483654" r:id="rId6"/>
-    <p:sldLayoutId id="2147483655" r:id="rId7"/>
-    <p:sldLayoutId id="2147483656" r:id="rId8"/>
-    <p:sldLayoutId id="2147483657" r:id="rId9"/>
-    <p:sldLayoutId id="2147483658" r:id="rId10"/>
-    <p:sldLayoutId id="2147483659" r:id="rId11"/>
+    <p:sldLayoutId id="2147483673" r:id="rId1"/>
+    <p:sldLayoutId id="2147483674" r:id="rId2"/>
+    <p:sldLayoutId id="2147483675" r:id="rId3"/>
+    <p:sldLayoutId id="2147483676" r:id="rId4"/>
+    <p:sldLayoutId id="2147483677" r:id="rId5"/>
+    <p:sldLayoutId id="2147483678" r:id="rId6"/>
+    <p:sldLayoutId id="2147483679" r:id="rId7"/>
+    <p:sldLayoutId id="2147483680" r:id="rId8"/>
+    <p:sldLayoutId id="2147483681" r:id="rId9"/>
+    <p:sldLayoutId id="2147483682" r:id="rId10"/>
+    <p:sldLayoutId id="2147483683" r:id="rId11"/>
   </p:sldLayoutIdLst>
   <p:txStyles>
     <p:titleStyle>
-      <a:lvl1pPr algn="l" defTabSz="914400" rtl="0" eaLnBrk="1" latinLnBrk="0" hangingPunct="1">
+      <a:lvl1pPr algn="l" defTabSz="1219170" rtl="0" eaLnBrk="1" latinLnBrk="0" hangingPunct="1">
         <a:lnSpc>
           <a:spcPct val="90000"/>
         </a:lnSpc>
@@ -2674,7 +2626,7 @@
           <a:spcPct val="0"/>
         </a:spcBef>
         <a:buNone/>
-        <a:defRPr sz="4400" kern="1200">
+        <a:defRPr sz="5867" kern="1200">
           <a:solidFill>
             <a:schemeClr val="tx1"/>
           </a:solidFill>
@@ -2685,16 +2637,16 @@
       </a:lvl1pPr>
     </p:titleStyle>
     <p:bodyStyle>
-      <a:lvl1pPr marL="228600" indent="-228600" algn="l" defTabSz="914400" rtl="0" eaLnBrk="1" latinLnBrk="0" hangingPunct="1">
+      <a:lvl1pPr marL="304792" indent="-304792" algn="l" defTabSz="1219170" rtl="0" eaLnBrk="1" latinLnBrk="0" hangingPunct="1">
         <a:lnSpc>
           <a:spcPct val="90000"/>
         </a:lnSpc>
         <a:spcBef>
-          <a:spcPts val="1000"/>
+          <a:spcPts val="1333"/>
         </a:spcBef>
-        <a:buFont typeface="Arial"/>
+        <a:buFont typeface="Arial" panose="020B0604020202020204" pitchFamily="34" charset="0"/>
         <a:buChar char="•"/>
-        <a:defRPr sz="2800" kern="1200">
+        <a:defRPr sz="3733" kern="1200">
           <a:solidFill>
             <a:schemeClr val="tx1"/>
           </a:solidFill>
@@ -2703,14 +2655,50 @@
           <a:cs typeface="+mn-cs"/>
         </a:defRPr>
       </a:lvl1pPr>
-      <a:lvl2pPr marL="685800" indent="-228600" algn="l" defTabSz="914400" rtl="0" eaLnBrk="1" latinLnBrk="0" hangingPunct="1">
+      <a:lvl2pPr marL="914377" indent="-304792" algn="l" defTabSz="1219170" rtl="0" eaLnBrk="1" latinLnBrk="0" hangingPunct="1">
         <a:lnSpc>
           <a:spcPct val="90000"/>
         </a:lnSpc>
         <a:spcBef>
-          <a:spcPts val="500"/>
+          <a:spcPts val="667"/>
         </a:spcBef>
-        <a:buFont typeface="Arial"/>
+        <a:buFont typeface="Arial" panose="020B0604020202020204" pitchFamily="34" charset="0"/>
+        <a:buChar char="•"/>
+        <a:defRPr sz="3200" kern="1200">
+          <a:solidFill>
+            <a:schemeClr val="tx1"/>
+          </a:solidFill>
+          <a:latin typeface="+mn-lt"/>
+          <a:ea typeface="+mn-ea"/>
+          <a:cs typeface="+mn-cs"/>
+        </a:defRPr>
+      </a:lvl2pPr>
+      <a:lvl3pPr marL="1523962" indent="-304792" algn="l" defTabSz="1219170" rtl="0" eaLnBrk="1" latinLnBrk="0" hangingPunct="1">
+        <a:lnSpc>
+          <a:spcPct val="90000"/>
+        </a:lnSpc>
+        <a:spcBef>
+          <a:spcPts val="667"/>
+        </a:spcBef>
+        <a:buFont typeface="Arial" panose="020B0604020202020204" pitchFamily="34" charset="0"/>
+        <a:buChar char="•"/>
+        <a:defRPr sz="2667" kern="1200">
+          <a:solidFill>
+            <a:schemeClr val="tx1"/>
+          </a:solidFill>
+          <a:latin typeface="+mn-lt"/>
+          <a:ea typeface="+mn-ea"/>
+          <a:cs typeface="+mn-cs"/>
+        </a:defRPr>
+      </a:lvl3pPr>
+      <a:lvl4pPr marL="2133547" indent="-304792" algn="l" defTabSz="1219170" rtl="0" eaLnBrk="1" latinLnBrk="0" hangingPunct="1">
+        <a:lnSpc>
+          <a:spcPct val="90000"/>
+        </a:lnSpc>
+        <a:spcBef>
+          <a:spcPts val="667"/>
+        </a:spcBef>
+        <a:buFont typeface="Arial" panose="020B0604020202020204" pitchFamily="34" charset="0"/>
         <a:buChar char="•"/>
         <a:defRPr sz="2400" kern="1200">
           <a:solidFill>
@@ -2720,53 +2708,17 @@
           <a:ea typeface="+mn-ea"/>
           <a:cs typeface="+mn-cs"/>
         </a:defRPr>
-      </a:lvl2pPr>
-      <a:lvl3pPr marL="1143000" indent="-228600" algn="l" defTabSz="914400" rtl="0" eaLnBrk="1" latinLnBrk="0" hangingPunct="1">
+      </a:lvl4pPr>
+      <a:lvl5pPr marL="2743131" indent="-304792" algn="l" defTabSz="1219170" rtl="0" eaLnBrk="1" latinLnBrk="0" hangingPunct="1">
         <a:lnSpc>
           <a:spcPct val="90000"/>
         </a:lnSpc>
         <a:spcBef>
-          <a:spcPts val="500"/>
+          <a:spcPts val="667"/>
         </a:spcBef>
-        <a:buFont typeface="Arial"/>
+        <a:buFont typeface="Arial" panose="020B0604020202020204" pitchFamily="34" charset="0"/>
         <a:buChar char="•"/>
-        <a:defRPr sz="2000" kern="1200">
-          <a:solidFill>
-            <a:schemeClr val="tx1"/>
-          </a:solidFill>
-          <a:latin typeface="+mn-lt"/>
-          <a:ea typeface="+mn-ea"/>
-          <a:cs typeface="+mn-cs"/>
-        </a:defRPr>
-      </a:lvl3pPr>
-      <a:lvl4pPr marL="1600200" indent="-228600" algn="l" defTabSz="914400" rtl="0" eaLnBrk="1" latinLnBrk="0" hangingPunct="1">
-        <a:lnSpc>
-          <a:spcPct val="90000"/>
-        </a:lnSpc>
-        <a:spcBef>
-          <a:spcPts val="500"/>
-        </a:spcBef>
-        <a:buFont typeface="Arial"/>
-        <a:buChar char="•"/>
-        <a:defRPr sz="1800" kern="1200">
-          <a:solidFill>
-            <a:schemeClr val="tx1"/>
-          </a:solidFill>
-          <a:latin typeface="+mn-lt"/>
-          <a:ea typeface="+mn-ea"/>
-          <a:cs typeface="+mn-cs"/>
-        </a:defRPr>
-      </a:lvl4pPr>
-      <a:lvl5pPr marL="2057400" indent="-228600" algn="l" defTabSz="914400" rtl="0" eaLnBrk="1" latinLnBrk="0" hangingPunct="1">
-        <a:lnSpc>
-          <a:spcPct val="90000"/>
-        </a:lnSpc>
-        <a:spcBef>
-          <a:spcPts val="500"/>
-        </a:spcBef>
-        <a:buFont typeface="Arial"/>
-        <a:buChar char="•"/>
-        <a:defRPr sz="1800" kern="1200">
+        <a:defRPr sz="2400" kern="1200">
           <a:solidFill>
             <a:schemeClr val="tx1"/>
           </a:solidFill>
@@ -2775,16 +2727,16 @@
           <a:cs typeface="+mn-cs"/>
         </a:defRPr>
       </a:lvl5pPr>
-      <a:lvl6pPr marL="2514600" indent="-228600" algn="l" defTabSz="914400" rtl="0" eaLnBrk="1" latinLnBrk="0" hangingPunct="1">
+      <a:lvl6pPr marL="3352716" indent="-304792" algn="l" defTabSz="1219170" rtl="0" eaLnBrk="1" latinLnBrk="0" hangingPunct="1">
         <a:lnSpc>
           <a:spcPct val="90000"/>
         </a:lnSpc>
         <a:spcBef>
-          <a:spcPts val="500"/>
+          <a:spcPts val="667"/>
         </a:spcBef>
-        <a:buFont typeface="Arial"/>
+        <a:buFont typeface="Arial" panose="020B0604020202020204" pitchFamily="34" charset="0"/>
         <a:buChar char="•"/>
-        <a:defRPr sz="1800" kern="1200">
+        <a:defRPr sz="2400" kern="1200">
           <a:solidFill>
             <a:schemeClr val="tx1"/>
           </a:solidFill>
@@ -2793,16 +2745,16 @@
           <a:cs typeface="+mn-cs"/>
         </a:defRPr>
       </a:lvl6pPr>
-      <a:lvl7pPr marL="2971800" indent="-228600" algn="l" defTabSz="914400" rtl="0" eaLnBrk="1" latinLnBrk="0" hangingPunct="1">
+      <a:lvl7pPr marL="3962301" indent="-304792" algn="l" defTabSz="1219170" rtl="0" eaLnBrk="1" latinLnBrk="0" hangingPunct="1">
         <a:lnSpc>
           <a:spcPct val="90000"/>
         </a:lnSpc>
         <a:spcBef>
-          <a:spcPts val="500"/>
+          <a:spcPts val="667"/>
         </a:spcBef>
-        <a:buFont typeface="Arial"/>
+        <a:buFont typeface="Arial" panose="020B0604020202020204" pitchFamily="34" charset="0"/>
         <a:buChar char="•"/>
-        <a:defRPr sz="1800" kern="1200">
+        <a:defRPr sz="2400" kern="1200">
           <a:solidFill>
             <a:schemeClr val="tx1"/>
           </a:solidFill>
@@ -2811,16 +2763,16 @@
           <a:cs typeface="+mn-cs"/>
         </a:defRPr>
       </a:lvl7pPr>
-      <a:lvl8pPr marL="3429000" indent="-228600" algn="l" defTabSz="914400" rtl="0" eaLnBrk="1" latinLnBrk="0" hangingPunct="1">
+      <a:lvl8pPr marL="4571886" indent="-304792" algn="l" defTabSz="1219170" rtl="0" eaLnBrk="1" latinLnBrk="0" hangingPunct="1">
         <a:lnSpc>
           <a:spcPct val="90000"/>
         </a:lnSpc>
         <a:spcBef>
-          <a:spcPts val="500"/>
+          <a:spcPts val="667"/>
         </a:spcBef>
-        <a:buFont typeface="Arial"/>
+        <a:buFont typeface="Arial" panose="020B0604020202020204" pitchFamily="34" charset="0"/>
         <a:buChar char="•"/>
-        <a:defRPr sz="1800" kern="1200">
+        <a:defRPr sz="2400" kern="1200">
           <a:solidFill>
             <a:schemeClr val="tx1"/>
           </a:solidFill>
@@ -2829,16 +2781,16 @@
           <a:cs typeface="+mn-cs"/>
         </a:defRPr>
       </a:lvl8pPr>
-      <a:lvl9pPr marL="3886200" indent="-228600" algn="l" defTabSz="914400" rtl="0" eaLnBrk="1" latinLnBrk="0" hangingPunct="1">
+      <a:lvl9pPr marL="5181470" indent="-304792" algn="l" defTabSz="1219170" rtl="0" eaLnBrk="1" latinLnBrk="0" hangingPunct="1">
         <a:lnSpc>
           <a:spcPct val="90000"/>
         </a:lnSpc>
         <a:spcBef>
-          <a:spcPts val="500"/>
+          <a:spcPts val="667"/>
         </a:spcBef>
-        <a:buFont typeface="Arial"/>
+        <a:buFont typeface="Arial" panose="020B0604020202020204" pitchFamily="34" charset="0"/>
         <a:buChar char="•"/>
-        <a:defRPr sz="1800" kern="1200">
+        <a:defRPr sz="2400" kern="1200">
           <a:solidFill>
             <a:schemeClr val="tx1"/>
           </a:solidFill>
@@ -2852,8 +2804,8 @@
       <a:defPPr>
         <a:defRPr lang="en-US"/>
       </a:defPPr>
-      <a:lvl1pPr marL="0" algn="l" defTabSz="914400" rtl="0" eaLnBrk="1" latinLnBrk="0" hangingPunct="1">
-        <a:defRPr sz="1800" kern="1200">
+      <a:lvl1pPr marL="0" algn="l" defTabSz="1219170" rtl="0" eaLnBrk="1" latinLnBrk="0" hangingPunct="1">
+        <a:defRPr sz="2400" kern="1200">
           <a:solidFill>
             <a:schemeClr val="tx1"/>
           </a:solidFill>
@@ -2862,8 +2814,8 @@
           <a:cs typeface="+mn-cs"/>
         </a:defRPr>
       </a:lvl1pPr>
-      <a:lvl2pPr marL="457200" algn="l" defTabSz="914400" rtl="0" eaLnBrk="1" latinLnBrk="0" hangingPunct="1">
-        <a:defRPr sz="1800" kern="1200">
+      <a:lvl2pPr marL="609585" algn="l" defTabSz="1219170" rtl="0" eaLnBrk="1" latinLnBrk="0" hangingPunct="1">
+        <a:defRPr sz="2400" kern="1200">
           <a:solidFill>
             <a:schemeClr val="tx1"/>
           </a:solidFill>
@@ -2872,8 +2824,8 @@
           <a:cs typeface="+mn-cs"/>
         </a:defRPr>
       </a:lvl2pPr>
-      <a:lvl3pPr marL="914400" algn="l" defTabSz="914400" rtl="0" eaLnBrk="1" latinLnBrk="0" hangingPunct="1">
-        <a:defRPr sz="1800" kern="1200">
+      <a:lvl3pPr marL="1219170" algn="l" defTabSz="1219170" rtl="0" eaLnBrk="1" latinLnBrk="0" hangingPunct="1">
+        <a:defRPr sz="2400" kern="1200">
           <a:solidFill>
             <a:schemeClr val="tx1"/>
           </a:solidFill>
@@ -2882,8 +2834,8 @@
           <a:cs typeface="+mn-cs"/>
         </a:defRPr>
       </a:lvl3pPr>
-      <a:lvl4pPr marL="1371600" algn="l" defTabSz="914400" rtl="0" eaLnBrk="1" latinLnBrk="0" hangingPunct="1">
-        <a:defRPr sz="1800" kern="1200">
+      <a:lvl4pPr marL="1828754" algn="l" defTabSz="1219170" rtl="0" eaLnBrk="1" latinLnBrk="0" hangingPunct="1">
+        <a:defRPr sz="2400" kern="1200">
           <a:solidFill>
             <a:schemeClr val="tx1"/>
           </a:solidFill>
@@ -2892,8 +2844,8 @@
           <a:cs typeface="+mn-cs"/>
         </a:defRPr>
       </a:lvl4pPr>
-      <a:lvl5pPr marL="1828800" algn="l" defTabSz="914400" rtl="0" eaLnBrk="1" latinLnBrk="0" hangingPunct="1">
-        <a:defRPr sz="1800" kern="1200">
+      <a:lvl5pPr marL="2438339" algn="l" defTabSz="1219170" rtl="0" eaLnBrk="1" latinLnBrk="0" hangingPunct="1">
+        <a:defRPr sz="2400" kern="1200">
           <a:solidFill>
             <a:schemeClr val="tx1"/>
           </a:solidFill>
@@ -2902,8 +2854,8 @@
           <a:cs typeface="+mn-cs"/>
         </a:defRPr>
       </a:lvl5pPr>
-      <a:lvl6pPr marL="2286000" algn="l" defTabSz="914400" rtl="0" eaLnBrk="1" latinLnBrk="0" hangingPunct="1">
-        <a:defRPr sz="1800" kern="1200">
+      <a:lvl6pPr marL="3047924" algn="l" defTabSz="1219170" rtl="0" eaLnBrk="1" latinLnBrk="0" hangingPunct="1">
+        <a:defRPr sz="2400" kern="1200">
           <a:solidFill>
             <a:schemeClr val="tx1"/>
           </a:solidFill>
@@ -2912,8 +2864,8 @@
           <a:cs typeface="+mn-cs"/>
         </a:defRPr>
       </a:lvl6pPr>
-      <a:lvl7pPr marL="2743200" algn="l" defTabSz="914400" rtl="0" eaLnBrk="1" latinLnBrk="0" hangingPunct="1">
-        <a:defRPr sz="1800" kern="1200">
+      <a:lvl7pPr marL="3657509" algn="l" defTabSz="1219170" rtl="0" eaLnBrk="1" latinLnBrk="0" hangingPunct="1">
+        <a:defRPr sz="2400" kern="1200">
           <a:solidFill>
             <a:schemeClr val="tx1"/>
           </a:solidFill>
@@ -2922,8 +2874,8 @@
           <a:cs typeface="+mn-cs"/>
         </a:defRPr>
       </a:lvl7pPr>
-      <a:lvl8pPr marL="3200400" algn="l" defTabSz="914400" rtl="0" eaLnBrk="1" latinLnBrk="0" hangingPunct="1">
-        <a:defRPr sz="1800" kern="1200">
+      <a:lvl8pPr marL="4267093" algn="l" defTabSz="1219170" rtl="0" eaLnBrk="1" latinLnBrk="0" hangingPunct="1">
+        <a:defRPr sz="2400" kern="1200">
           <a:solidFill>
             <a:schemeClr val="tx1"/>
           </a:solidFill>
@@ -2932,8 +2884,8 @@
           <a:cs typeface="+mn-cs"/>
         </a:defRPr>
       </a:lvl8pPr>
-      <a:lvl9pPr marL="3657600" algn="l" defTabSz="914400" rtl="0" eaLnBrk="1" latinLnBrk="0" hangingPunct="1">
-        <a:defRPr sz="1800" kern="1200">
+      <a:lvl9pPr marL="4876678" algn="l" defTabSz="1219170" rtl="0" eaLnBrk="1" latinLnBrk="0" hangingPunct="1">
+        <a:defRPr sz="2400" kern="1200">
           <a:solidFill>
             <a:schemeClr val="tx1"/>
           </a:solidFill>
@@ -2964,16 +2916,525 @@
           <a:chExt cx="0" cy="0"/>
         </a:xfrm>
       </p:grpSpPr>
+      <p:grpSp>
+        <p:nvGrpSpPr>
+          <p:cNvPr id="2" name="Group 1"/>
+          <p:cNvGrpSpPr/>
+          <p:nvPr/>
+        </p:nvGrpSpPr>
+        <p:grpSpPr>
+          <a:xfrm>
+            <a:off x="0" y="0"/>
+            <a:ext cx="12192000" cy="6858000"/>
+            <a:chOff x="1" y="1143000"/>
+            <a:chExt cx="12192000" cy="6858000"/>
+          </a:xfrm>
+        </p:grpSpPr>
+        <p:pic>
+          <p:nvPicPr>
+            <p:cNvPr id="9" name="Picture 8"/>
+            <p:cNvPicPr>
+              <a:picLocks noChangeAspect="1"/>
+            </p:cNvPicPr>
+            <p:nvPr/>
+          </p:nvPicPr>
+          <p:blipFill rotWithShape="1">
+            <a:blip r:embed="rId2" cstate="print">
+              <a:extLst>
+                <a:ext uri="{28A0092B-C50C-407E-A947-70E740481C1C}">
+                  <a14:useLocalDpi xmlns:a14="http://schemas.microsoft.com/office/drawing/2010/main" val="0"/>
+                </a:ext>
+              </a:extLst>
+            </a:blip>
+            <a:srcRect t="15625"/>
+            <a:stretch/>
+          </p:blipFill>
+          <p:spPr>
+            <a:xfrm>
+              <a:off x="1" y="1143000"/>
+              <a:ext cx="12192000" cy="6858000"/>
+            </a:xfrm>
+            <a:prstGeom prst="rect">
+              <a:avLst/>
+            </a:prstGeom>
+          </p:spPr>
+        </p:pic>
+        <p:sp>
+          <p:nvSpPr>
+            <p:cNvPr id="11" name="TextBox 10"/>
+            <p:cNvSpPr txBox="1"/>
+            <p:nvPr/>
+          </p:nvSpPr>
+          <p:spPr>
+            <a:xfrm>
+              <a:off x="7371807" y="4254863"/>
+              <a:ext cx="2442754" cy="369332"/>
+            </a:xfrm>
+            <a:prstGeom prst="rect">
+              <a:avLst/>
+            </a:prstGeom>
+            <a:noFill/>
+            <a:effectLst>
+              <a:glow>
+                <a:schemeClr val="bg1">
+                  <a:alpha val="40000"/>
+                </a:schemeClr>
+              </a:glow>
+            </a:effectLst>
+          </p:spPr>
+          <p:txBody>
+            <a:bodyPr wrap="square" rtlCol="0">
+              <a:spAutoFit/>
+            </a:bodyPr>
+            <a:lstStyle/>
+            <a:p>
+              <a:r>
+                <a:rPr lang="en-US" b="1" dirty="0">
+                  <a:effectLst>
+                    <a:glow rad="50800">
+                      <a:schemeClr val="bg1">
+                        <a:alpha val="50000"/>
+                      </a:schemeClr>
+                    </a:glow>
+                    <a:outerShdw blurRad="127000" dir="5400000" algn="ctr" rotWithShape="0">
+                      <a:schemeClr val="bg1"/>
+                    </a:outerShdw>
+                  </a:effectLst>
+                </a:rPr>
+                <a:t>(</a:t>
+              </a:r>
+              <a:r>
+                <a:rPr lang="en-US" b="1" dirty="0" err="1">
+                  <a:effectLst>
+                    <a:glow rad="50800">
+                      <a:schemeClr val="bg1">
+                        <a:alpha val="50000"/>
+                      </a:schemeClr>
+                    </a:glow>
+                    <a:outerShdw blurRad="127000" dir="5400000" algn="ctr" rotWithShape="0">
+                      <a:schemeClr val="bg1"/>
+                    </a:outerShdw>
+                  </a:effectLst>
+                </a:rPr>
+                <a:t>i</a:t>
+              </a:r>
+              <a:r>
+                <a:rPr lang="en-US" b="1" dirty="0">
+                  <a:effectLst>
+                    <a:glow rad="50800">
+                      <a:schemeClr val="bg1">
+                        <a:alpha val="50000"/>
+                      </a:schemeClr>
+                    </a:glow>
+                    <a:outerShdw blurRad="127000" dir="5400000" algn="ctr" rotWithShape="0">
+                      <a:schemeClr val="bg1"/>
+                    </a:outerShdw>
+                  </a:effectLst>
+                </a:rPr>
+                <a:t>)</a:t>
+              </a:r>
+            </a:p>
+          </p:txBody>
+        </p:sp>
+        <p:sp>
+          <p:nvSpPr>
+            <p:cNvPr id="12" name="TextBox 11"/>
+            <p:cNvSpPr txBox="1"/>
+            <p:nvPr/>
+          </p:nvSpPr>
+          <p:spPr>
+            <a:xfrm>
+              <a:off x="4766493" y="1460863"/>
+              <a:ext cx="2442754" cy="369332"/>
+            </a:xfrm>
+            <a:prstGeom prst="rect">
+              <a:avLst/>
+            </a:prstGeom>
+            <a:noFill/>
+            <a:effectLst>
+              <a:glow>
+                <a:schemeClr val="bg1">
+                  <a:alpha val="40000"/>
+                </a:schemeClr>
+              </a:glow>
+            </a:effectLst>
+          </p:spPr>
+          <p:txBody>
+            <a:bodyPr wrap="square" rtlCol="0">
+              <a:spAutoFit/>
+            </a:bodyPr>
+            <a:lstStyle/>
+            <a:p>
+              <a:r>
+                <a:rPr lang="en-US" b="1" dirty="0">
+                  <a:effectLst>
+                    <a:glow rad="50800">
+                      <a:schemeClr val="bg1">
+                        <a:alpha val="50000"/>
+                      </a:schemeClr>
+                    </a:glow>
+                    <a:outerShdw blurRad="127000" dir="5400000" algn="ctr" rotWithShape="0">
+                      <a:schemeClr val="bg1"/>
+                    </a:outerShdw>
+                  </a:effectLst>
+                </a:rPr>
+                <a:t>(ii)</a:t>
+              </a:r>
+            </a:p>
+          </p:txBody>
+        </p:sp>
+        <p:sp>
+          <p:nvSpPr>
+            <p:cNvPr id="13" name="TextBox 12"/>
+            <p:cNvSpPr txBox="1"/>
+            <p:nvPr/>
+          </p:nvSpPr>
+          <p:spPr>
+            <a:xfrm>
+              <a:off x="4222208" y="6344920"/>
+              <a:ext cx="2442754" cy="369332"/>
+            </a:xfrm>
+            <a:prstGeom prst="rect">
+              <a:avLst/>
+            </a:prstGeom>
+            <a:noFill/>
+            <a:effectLst>
+              <a:glow>
+                <a:schemeClr val="bg1">
+                  <a:alpha val="40000"/>
+                </a:schemeClr>
+              </a:glow>
+            </a:effectLst>
+          </p:spPr>
+          <p:txBody>
+            <a:bodyPr wrap="square" rtlCol="0">
+              <a:spAutoFit/>
+            </a:bodyPr>
+            <a:lstStyle/>
+            <a:p>
+              <a:r>
+                <a:rPr lang="en-US" b="1" dirty="0">
+                  <a:effectLst>
+                    <a:glow rad="50800">
+                      <a:schemeClr val="bg1">
+                        <a:alpha val="50000"/>
+                      </a:schemeClr>
+                    </a:glow>
+                    <a:outerShdw blurRad="127000" dir="5400000" algn="ctr" rotWithShape="0">
+                      <a:schemeClr val="bg1"/>
+                    </a:outerShdw>
+                  </a:effectLst>
+                </a:rPr>
+                <a:t>(iii)</a:t>
+              </a:r>
+            </a:p>
+          </p:txBody>
+        </p:sp>
+        <p:sp>
+          <p:nvSpPr>
+            <p:cNvPr id="14" name="TextBox 13"/>
+            <p:cNvSpPr txBox="1"/>
+            <p:nvPr/>
+          </p:nvSpPr>
+          <p:spPr>
+            <a:xfrm>
+              <a:off x="4874624" y="3718225"/>
+              <a:ext cx="2442754" cy="369332"/>
+            </a:xfrm>
+            <a:prstGeom prst="rect">
+              <a:avLst/>
+            </a:prstGeom>
+            <a:noFill/>
+            <a:effectLst>
+              <a:glow>
+                <a:schemeClr val="bg1">
+                  <a:alpha val="40000"/>
+                </a:schemeClr>
+              </a:glow>
+            </a:effectLst>
+          </p:spPr>
+          <p:txBody>
+            <a:bodyPr wrap="square" rtlCol="0">
+              <a:spAutoFit/>
+            </a:bodyPr>
+            <a:lstStyle/>
+            <a:p>
+              <a:r>
+                <a:rPr lang="en-US" b="1" dirty="0">
+                  <a:effectLst>
+                    <a:glow rad="50800">
+                      <a:schemeClr val="bg1">
+                        <a:alpha val="50000"/>
+                      </a:schemeClr>
+                    </a:glow>
+                    <a:outerShdw blurRad="127000" dir="5400000" algn="ctr" rotWithShape="0">
+                      <a:schemeClr val="bg1"/>
+                    </a:outerShdw>
+                  </a:effectLst>
+                </a:rPr>
+                <a:t>(iv)</a:t>
+              </a:r>
+            </a:p>
+          </p:txBody>
+        </p:sp>
+        <p:sp>
+          <p:nvSpPr>
+            <p:cNvPr id="15" name="TextBox 14"/>
+            <p:cNvSpPr txBox="1"/>
+            <p:nvPr/>
+          </p:nvSpPr>
+          <p:spPr>
+            <a:xfrm>
+              <a:off x="4222208" y="3048725"/>
+              <a:ext cx="2442754" cy="369332"/>
+            </a:xfrm>
+            <a:prstGeom prst="rect">
+              <a:avLst/>
+            </a:prstGeom>
+            <a:noFill/>
+            <a:effectLst>
+              <a:glow>
+                <a:schemeClr val="bg1">
+                  <a:alpha val="40000"/>
+                </a:schemeClr>
+              </a:glow>
+            </a:effectLst>
+          </p:spPr>
+          <p:txBody>
+            <a:bodyPr wrap="square" rtlCol="0">
+              <a:spAutoFit/>
+            </a:bodyPr>
+            <a:lstStyle/>
+            <a:p>
+              <a:r>
+                <a:rPr lang="en-US" b="1" dirty="0">
+                  <a:effectLst>
+                    <a:glow rad="50800">
+                      <a:schemeClr val="bg1">
+                        <a:alpha val="50000"/>
+                      </a:schemeClr>
+                    </a:glow>
+                    <a:outerShdw blurRad="127000" dir="5400000" algn="ctr" rotWithShape="0">
+                      <a:schemeClr val="bg1"/>
+                    </a:outerShdw>
+                  </a:effectLst>
+                </a:rPr>
+                <a:t>(v)</a:t>
+              </a:r>
+            </a:p>
+          </p:txBody>
+        </p:sp>
+        <p:sp>
+          <p:nvSpPr>
+            <p:cNvPr id="16" name="TextBox 15"/>
+            <p:cNvSpPr txBox="1"/>
+            <p:nvPr/>
+          </p:nvSpPr>
+          <p:spPr>
+            <a:xfrm>
+              <a:off x="5651865" y="2434240"/>
+              <a:ext cx="2442754" cy="369332"/>
+            </a:xfrm>
+            <a:prstGeom prst="rect">
+              <a:avLst/>
+            </a:prstGeom>
+            <a:noFill/>
+            <a:effectLst>
+              <a:glow>
+                <a:schemeClr val="bg1">
+                  <a:alpha val="40000"/>
+                </a:schemeClr>
+              </a:glow>
+            </a:effectLst>
+          </p:spPr>
+          <p:txBody>
+            <a:bodyPr wrap="square" rtlCol="0">
+              <a:spAutoFit/>
+            </a:bodyPr>
+            <a:lstStyle/>
+            <a:p>
+              <a:r>
+                <a:rPr lang="en-US" b="1" dirty="0">
+                  <a:effectLst>
+                    <a:glow rad="50800">
+                      <a:schemeClr val="bg1">
+                        <a:alpha val="50000"/>
+                      </a:schemeClr>
+                    </a:glow>
+                    <a:outerShdw blurRad="127000" dir="5400000" algn="ctr" rotWithShape="0">
+                      <a:schemeClr val="bg1"/>
+                    </a:outerShdw>
+                  </a:effectLst>
+                </a:rPr>
+                <a:t>(vi)</a:t>
+              </a:r>
+            </a:p>
+          </p:txBody>
+        </p:sp>
+        <p:sp>
+          <p:nvSpPr>
+            <p:cNvPr id="17" name="TextBox 16"/>
+            <p:cNvSpPr txBox="1"/>
+            <p:nvPr/>
+          </p:nvSpPr>
+          <p:spPr>
+            <a:xfrm>
+              <a:off x="8242665" y="5489497"/>
+              <a:ext cx="2442754" cy="369332"/>
+            </a:xfrm>
+            <a:prstGeom prst="rect">
+              <a:avLst/>
+            </a:prstGeom>
+            <a:noFill/>
+            <a:effectLst>
+              <a:glow>
+                <a:schemeClr val="bg1">
+                  <a:alpha val="40000"/>
+                </a:schemeClr>
+              </a:glow>
+            </a:effectLst>
+          </p:spPr>
+          <p:txBody>
+            <a:bodyPr wrap="square" rtlCol="0">
+              <a:spAutoFit/>
+            </a:bodyPr>
+            <a:lstStyle/>
+            <a:p>
+              <a:r>
+                <a:rPr lang="en-US" b="1" dirty="0">
+                  <a:effectLst>
+                    <a:glow rad="50800">
+                      <a:schemeClr val="bg1">
+                        <a:alpha val="50000"/>
+                      </a:schemeClr>
+                    </a:glow>
+                    <a:outerShdw blurRad="127000" dir="5400000" algn="ctr" rotWithShape="0">
+                      <a:schemeClr val="bg1"/>
+                    </a:outerShdw>
+                  </a:effectLst>
+                </a:rPr>
+                <a:t>(vii)</a:t>
+              </a:r>
+            </a:p>
+          </p:txBody>
+        </p:sp>
+        <p:sp>
+          <p:nvSpPr>
+            <p:cNvPr id="18" name="TextBox 17"/>
+            <p:cNvSpPr txBox="1"/>
+            <p:nvPr/>
+          </p:nvSpPr>
+          <p:spPr>
+            <a:xfrm>
+              <a:off x="7567751" y="6529586"/>
+              <a:ext cx="2442754" cy="369332"/>
+            </a:xfrm>
+            <a:prstGeom prst="rect">
+              <a:avLst/>
+            </a:prstGeom>
+            <a:noFill/>
+            <a:effectLst>
+              <a:glow>
+                <a:schemeClr val="bg1">
+                  <a:alpha val="40000"/>
+                </a:schemeClr>
+              </a:glow>
+            </a:effectLst>
+          </p:spPr>
+          <p:txBody>
+            <a:bodyPr wrap="square" rtlCol="0">
+              <a:spAutoFit/>
+            </a:bodyPr>
+            <a:lstStyle/>
+            <a:p>
+              <a:r>
+                <a:rPr lang="en-US" b="1" dirty="0">
+                  <a:effectLst>
+                    <a:glow rad="50800">
+                      <a:schemeClr val="bg1">
+                        <a:alpha val="50000"/>
+                      </a:schemeClr>
+                    </a:glow>
+                    <a:outerShdw blurRad="127000" dir="5400000" algn="ctr" rotWithShape="0">
+                      <a:schemeClr val="bg1"/>
+                    </a:outerShdw>
+                  </a:effectLst>
+                </a:rPr>
+                <a:t>(viii)</a:t>
+              </a:r>
+            </a:p>
+          </p:txBody>
+        </p:sp>
+        <p:sp>
+          <p:nvSpPr>
+            <p:cNvPr id="19" name="TextBox 18"/>
+            <p:cNvSpPr txBox="1"/>
+            <p:nvPr/>
+          </p:nvSpPr>
+          <p:spPr>
+            <a:xfrm>
+              <a:off x="7317378" y="3002014"/>
+              <a:ext cx="2442754" cy="369332"/>
+            </a:xfrm>
+            <a:prstGeom prst="rect">
+              <a:avLst/>
+            </a:prstGeom>
+            <a:noFill/>
+            <a:effectLst>
+              <a:glow>
+                <a:schemeClr val="bg1">
+                  <a:alpha val="40000"/>
+                </a:schemeClr>
+              </a:glow>
+            </a:effectLst>
+          </p:spPr>
+          <p:txBody>
+            <a:bodyPr wrap="square" rtlCol="0">
+              <a:spAutoFit/>
+            </a:bodyPr>
+            <a:lstStyle/>
+            <a:p>
+              <a:r>
+                <a:rPr lang="en-US" b="1">
+                  <a:effectLst>
+                    <a:glow rad="50800">
+                      <a:schemeClr val="bg1">
+                        <a:alpha val="50000"/>
+                      </a:schemeClr>
+                    </a:glow>
+                    <a:outerShdw blurRad="127000" dir="5400000" algn="ctr" rotWithShape="0">
+                      <a:schemeClr val="bg1"/>
+                    </a:outerShdw>
+                  </a:effectLst>
+                </a:rPr>
+                <a:t>(ix)</a:t>
+              </a:r>
+              <a:endParaRPr lang="en-US" b="1" dirty="0">
+                <a:effectLst>
+                  <a:glow rad="50800">
+                    <a:schemeClr val="bg1">
+                      <a:alpha val="50000"/>
+                    </a:schemeClr>
+                  </a:glow>
+                  <a:outerShdw blurRad="127000" dir="5400000" algn="ctr" rotWithShape="0">
+                    <a:schemeClr val="bg1"/>
+                  </a:outerShdw>
+                </a:effectLst>
+              </a:endParaRPr>
+            </a:p>
+          </p:txBody>
+        </p:sp>
+      </p:grpSp>
       <p:pic>
         <p:nvPicPr>
-          <p:cNvPr id="9" name="Picture 8"/>
+          <p:cNvPr id="3" name="Picture 2"/>
           <p:cNvPicPr>
             <a:picLocks noChangeAspect="1"/>
           </p:cNvPicPr>
           <p:nvPr/>
         </p:nvPicPr>
         <p:blipFill>
-          <a:blip r:embed="rId2" cstate="print">
+          <a:blip r:embed="rId3">
             <a:extLst>
               <a:ext uri="{28A0092B-C50C-407E-A947-70E740481C1C}">
                 <a14:useLocalDpi xmlns:a14="http://schemas.microsoft.com/office/drawing/2010/main" val="0"/>
@@ -2986,8 +3447,8 @@
         </p:blipFill>
         <p:spPr>
           <a:xfrm>
-            <a:off x="1" y="-1269999"/>
-            <a:ext cx="12192000" cy="8127999"/>
+            <a:off x="0" y="6858000"/>
+            <a:ext cx="12191999" cy="2947295"/>
           </a:xfrm>
           <a:prstGeom prst="rect">
             <a:avLst/>
@@ -2996,13 +3457,131 @@
       </p:pic>
       <p:sp>
         <p:nvSpPr>
-          <p:cNvPr id="11" name="TextBox 10"/>
+          <p:cNvPr id="20" name="TextBox 19"/>
           <p:cNvSpPr txBox="1"/>
           <p:nvPr/>
         </p:nvSpPr>
         <p:spPr>
           <a:xfrm>
-            <a:off x="7371807" y="3111863"/>
+            <a:off x="-15766" y="-57038"/>
+            <a:ext cx="2442754" cy="646331"/>
+          </a:xfrm>
+          <a:prstGeom prst="rect">
+            <a:avLst/>
+          </a:prstGeom>
+          <a:noFill/>
+          <a:effectLst>
+            <a:glow>
+              <a:schemeClr val="bg1">
+                <a:alpha val="40000"/>
+              </a:schemeClr>
+            </a:glow>
+          </a:effectLst>
+        </p:spPr>
+        <p:txBody>
+          <a:bodyPr wrap="square" rtlCol="0">
+            <a:spAutoFit/>
+          </a:bodyPr>
+          <a:lstStyle/>
+          <a:p>
+            <a:r>
+              <a:rPr lang="en-US" sz="3600" b="1" dirty="0" smtClean="0">
+                <a:effectLst>
+                  <a:glow rad="50800">
+                    <a:schemeClr val="bg1">
+                      <a:alpha val="50000"/>
+                    </a:schemeClr>
+                  </a:glow>
+                  <a:outerShdw blurRad="127000" dir="5400000" algn="ctr" rotWithShape="0">
+                    <a:schemeClr val="bg1"/>
+                  </a:outerShdw>
+                </a:effectLst>
+              </a:rPr>
+              <a:t>(a)</a:t>
+            </a:r>
+            <a:endParaRPr lang="en-US" sz="3600" b="1" dirty="0">
+              <a:effectLst>
+                <a:glow rad="50800">
+                  <a:schemeClr val="bg1">
+                    <a:alpha val="50000"/>
+                  </a:schemeClr>
+                </a:glow>
+                <a:outerShdw blurRad="127000" dir="5400000" algn="ctr" rotWithShape="0">
+                  <a:schemeClr val="bg1"/>
+                </a:outerShdw>
+              </a:effectLst>
+            </a:endParaRPr>
+          </a:p>
+        </p:txBody>
+      </p:sp>
+      <p:sp>
+        <p:nvSpPr>
+          <p:cNvPr id="21" name="TextBox 20"/>
+          <p:cNvSpPr txBox="1"/>
+          <p:nvPr/>
+        </p:nvSpPr>
+        <p:spPr>
+          <a:xfrm>
+            <a:off x="0" y="6800962"/>
+            <a:ext cx="2442754" cy="646331"/>
+          </a:xfrm>
+          <a:prstGeom prst="rect">
+            <a:avLst/>
+          </a:prstGeom>
+          <a:noFill/>
+          <a:effectLst>
+            <a:glow>
+              <a:schemeClr val="bg1">
+                <a:alpha val="40000"/>
+              </a:schemeClr>
+            </a:glow>
+          </a:effectLst>
+        </p:spPr>
+        <p:txBody>
+          <a:bodyPr wrap="square" rtlCol="0">
+            <a:spAutoFit/>
+          </a:bodyPr>
+          <a:lstStyle/>
+          <a:p>
+            <a:r>
+              <a:rPr lang="en-US" sz="3600" b="1" smtClean="0">
+                <a:effectLst>
+                  <a:glow rad="50800">
+                    <a:schemeClr val="bg1">
+                      <a:alpha val="50000"/>
+                    </a:schemeClr>
+                  </a:glow>
+                  <a:outerShdw blurRad="127000" dir="5400000" algn="ctr" rotWithShape="0">
+                    <a:schemeClr val="bg1"/>
+                  </a:outerShdw>
+                </a:effectLst>
+              </a:rPr>
+              <a:t>(b)</a:t>
+            </a:r>
+            <a:endParaRPr lang="en-US" sz="3600" b="1" dirty="0">
+              <a:effectLst>
+                <a:glow rad="50800">
+                  <a:schemeClr val="bg1">
+                    <a:alpha val="50000"/>
+                  </a:schemeClr>
+                </a:glow>
+                <a:outerShdw blurRad="127000" dir="5400000" algn="ctr" rotWithShape="0">
+                  <a:schemeClr val="bg1"/>
+                </a:outerShdw>
+              </a:effectLst>
+            </a:endParaRPr>
+          </a:p>
+        </p:txBody>
+      </p:sp>
+      <p:sp>
+        <p:nvSpPr>
+          <p:cNvPr id="22" name="TextBox 21"/>
+          <p:cNvSpPr txBox="1"/>
+          <p:nvPr/>
+        </p:nvSpPr>
+        <p:spPr>
+          <a:xfrm>
+            <a:off x="526469" y="7986965"/>
             <a:ext cx="2442754" cy="369332"/>
           </a:xfrm>
           <a:prstGeom prst="rect">
@@ -3085,13 +3664,13 @@
       </p:sp>
       <p:sp>
         <p:nvSpPr>
-          <p:cNvPr id="12" name="TextBox 11"/>
+          <p:cNvPr id="23" name="TextBox 22"/>
           <p:cNvSpPr txBox="1"/>
           <p:nvPr/>
         </p:nvSpPr>
         <p:spPr>
           <a:xfrm>
-            <a:off x="4766493" y="317863"/>
+            <a:off x="2323738" y="8110221"/>
             <a:ext cx="2442754" cy="369332"/>
           </a:xfrm>
           <a:prstGeom prst="rect">
@@ -3113,6 +3692,36 @@
           <a:lstStyle/>
           <a:p>
             <a:r>
+              <a:rPr lang="en-US" b="1" smtClean="0">
+                <a:effectLst>
+                  <a:glow rad="50800">
+                    <a:schemeClr val="bg1">
+                      <a:alpha val="50000"/>
+                    </a:schemeClr>
+                  </a:glow>
+                  <a:outerShdw blurRad="127000" dir="5400000" algn="ctr" rotWithShape="0">
+                    <a:schemeClr val="bg1"/>
+                  </a:outerShdw>
+                </a:effectLst>
+              </a:rPr>
+              <a:t>(ii</a:t>
+            </a:r>
+            <a:r>
+              <a:rPr lang="en-US" b="1" smtClean="0">
+                <a:effectLst>
+                  <a:glow rad="50800">
+                    <a:schemeClr val="bg1">
+                      <a:alpha val="50000"/>
+                    </a:schemeClr>
+                  </a:glow>
+                  <a:outerShdw blurRad="127000" dir="5400000" algn="ctr" rotWithShape="0">
+                    <a:schemeClr val="bg1"/>
+                  </a:outerShdw>
+                </a:effectLst>
+              </a:rPr>
+              <a:t>i</a:t>
+            </a:r>
+            <a:r>
               <a:rPr lang="en-US" b="1" dirty="0" smtClean="0">
                 <a:effectLst>
                   <a:glow rad="50800">
@@ -3125,7 +3734,7 @@
                   </a:outerShdw>
                 </a:effectLst>
               </a:rPr>
-              <a:t>(ii)</a:t>
+              <a:t>)</a:t>
             </a:r>
             <a:endParaRPr lang="en-US" b="1" dirty="0">
               <a:effectLst>
@@ -3144,13 +3753,13 @@
       </p:sp>
       <p:sp>
         <p:nvSpPr>
-          <p:cNvPr id="13" name="TextBox 12"/>
+          <p:cNvPr id="24" name="TextBox 23"/>
           <p:cNvSpPr txBox="1"/>
           <p:nvPr/>
         </p:nvSpPr>
         <p:spPr>
           <a:xfrm>
-            <a:off x="4222208" y="5201920"/>
+            <a:off x="1779453" y="9189452"/>
             <a:ext cx="2442754" cy="369332"/>
           </a:xfrm>
           <a:prstGeom prst="rect">
@@ -3172,7 +3781,7 @@
           <a:lstStyle/>
           <a:p>
             <a:r>
-              <a:rPr lang="en-US" b="1" dirty="0" smtClean="0">
+              <a:rPr lang="en-US" b="1" smtClean="0">
                 <a:effectLst>
                   <a:glow rad="50800">
                     <a:schemeClr val="bg1">
@@ -3184,7 +3793,22 @@
                   </a:outerShdw>
                 </a:effectLst>
               </a:rPr>
-              <a:t>(iii)</a:t>
+              <a:t>(i</a:t>
+            </a:r>
+            <a:r>
+              <a:rPr lang="en-US" b="1" smtClean="0">
+                <a:effectLst>
+                  <a:glow rad="50800">
+                    <a:schemeClr val="bg1">
+                      <a:alpha val="50000"/>
+                    </a:schemeClr>
+                  </a:glow>
+                  <a:outerShdw blurRad="127000" dir="5400000" algn="ctr" rotWithShape="0">
+                    <a:schemeClr val="bg1"/>
+                  </a:outerShdw>
+                </a:effectLst>
+              </a:rPr>
+              <a:t>i)</a:t>
             </a:r>
             <a:endParaRPr lang="en-US" b="1" dirty="0">
               <a:effectLst>
@@ -3203,13 +3827,13 @@
       </p:sp>
       <p:sp>
         <p:nvSpPr>
-          <p:cNvPr id="14" name="TextBox 13"/>
+          <p:cNvPr id="25" name="TextBox 24"/>
           <p:cNvSpPr txBox="1"/>
           <p:nvPr/>
         </p:nvSpPr>
         <p:spPr>
           <a:xfrm>
-            <a:off x="4874624" y="2575225"/>
+            <a:off x="2969223" y="7545195"/>
             <a:ext cx="2442754" cy="369332"/>
           </a:xfrm>
           <a:prstGeom prst="rect">
@@ -3243,7 +3867,22 @@
                   </a:outerShdw>
                 </a:effectLst>
               </a:rPr>
-              <a:t>(iv)</a:t>
+              <a:t>(iv</a:t>
+            </a:r>
+            <a:r>
+              <a:rPr lang="en-US" b="1" dirty="0" smtClean="0">
+                <a:effectLst>
+                  <a:glow rad="50800">
+                    <a:schemeClr val="bg1">
+                      <a:alpha val="50000"/>
+                    </a:schemeClr>
+                  </a:glow>
+                  <a:outerShdw blurRad="127000" dir="5400000" algn="ctr" rotWithShape="0">
+                    <a:schemeClr val="bg1"/>
+                  </a:outerShdw>
+                </a:effectLst>
+              </a:rPr>
+              <a:t>)</a:t>
             </a:r>
             <a:endParaRPr lang="en-US" b="1" dirty="0">
               <a:effectLst>
@@ -3262,13 +3901,13 @@
       </p:sp>
       <p:sp>
         <p:nvSpPr>
-          <p:cNvPr id="15" name="TextBox 14"/>
+          <p:cNvPr id="26" name="TextBox 25"/>
           <p:cNvSpPr txBox="1"/>
           <p:nvPr/>
         </p:nvSpPr>
         <p:spPr>
           <a:xfrm>
-            <a:off x="4222208" y="1905725"/>
+            <a:off x="4048710" y="8809235"/>
             <a:ext cx="2442754" cy="369332"/>
           </a:xfrm>
           <a:prstGeom prst="rect">
@@ -3290,7 +3929,7 @@
           <a:lstStyle/>
           <a:p>
             <a:r>
-              <a:rPr lang="en-US" b="1" dirty="0" smtClean="0">
+              <a:rPr lang="en-US" b="1" smtClean="0">
                 <a:effectLst>
                   <a:glow rad="50800">
                     <a:schemeClr val="bg1">
@@ -3302,7 +3941,22 @@
                   </a:outerShdw>
                 </a:effectLst>
               </a:rPr>
-              <a:t>(v)</a:t>
+              <a:t>(v</a:t>
+            </a:r>
+            <a:r>
+              <a:rPr lang="en-US" b="1" smtClean="0">
+                <a:effectLst>
+                  <a:glow rad="50800">
+                    <a:schemeClr val="bg1">
+                      <a:alpha val="50000"/>
+                    </a:schemeClr>
+                  </a:glow>
+                  <a:outerShdw blurRad="127000" dir="5400000" algn="ctr" rotWithShape="0">
+                    <a:schemeClr val="bg1"/>
+                  </a:outerShdw>
+                </a:effectLst>
+              </a:rPr>
+              <a:t>)</a:t>
             </a:r>
             <a:endParaRPr lang="en-US" b="1" dirty="0">
               <a:effectLst>
@@ -3321,13 +3975,13 @@
       </p:sp>
       <p:sp>
         <p:nvSpPr>
-          <p:cNvPr id="16" name="TextBox 15"/>
+          <p:cNvPr id="27" name="TextBox 26"/>
           <p:cNvSpPr txBox="1"/>
           <p:nvPr/>
         </p:nvSpPr>
         <p:spPr>
           <a:xfrm>
-            <a:off x="5651865" y="1291240"/>
+            <a:off x="4051178" y="9493424"/>
             <a:ext cx="2442754" cy="369332"/>
           </a:xfrm>
           <a:prstGeom prst="rect">
@@ -3349,7 +4003,7 @@
           <a:lstStyle/>
           <a:p>
             <a:r>
-              <a:rPr lang="en-US" b="1" dirty="0" smtClean="0">
+              <a:rPr lang="en-US" b="1" smtClean="0">
                 <a:effectLst>
                   <a:glow rad="50800">
                     <a:schemeClr val="bg1">
@@ -3361,7 +4015,22 @@
                   </a:outerShdw>
                 </a:effectLst>
               </a:rPr>
-              <a:t>(vi)</a:t>
+              <a:t>(vi</a:t>
+            </a:r>
+            <a:r>
+              <a:rPr lang="en-US" b="1" smtClean="0">
+                <a:effectLst>
+                  <a:glow rad="50800">
+                    <a:schemeClr val="bg1">
+                      <a:alpha val="50000"/>
+                    </a:schemeClr>
+                  </a:glow>
+                  <a:outerShdw blurRad="127000" dir="5400000" algn="ctr" rotWithShape="0">
+                    <a:schemeClr val="bg1"/>
+                  </a:outerShdw>
+                </a:effectLst>
+              </a:rPr>
+              <a:t>)</a:t>
             </a:r>
             <a:endParaRPr lang="en-US" b="1" dirty="0">
               <a:effectLst>
@@ -3380,13 +4049,13 @@
       </p:sp>
       <p:sp>
         <p:nvSpPr>
-          <p:cNvPr id="17" name="TextBox 16"/>
+          <p:cNvPr id="28" name="TextBox 27"/>
           <p:cNvSpPr txBox="1"/>
           <p:nvPr/>
         </p:nvSpPr>
         <p:spPr>
           <a:xfrm>
-            <a:off x="8242665" y="4346497"/>
+            <a:off x="5609048" y="9656580"/>
             <a:ext cx="2442754" cy="369332"/>
           </a:xfrm>
           <a:prstGeom prst="rect">
@@ -3420,7 +4089,7 @@
                   </a:outerShdw>
                 </a:effectLst>
               </a:rPr>
-              <a:t>(vii)</a:t>
+              <a:t>(viii)</a:t>
             </a:r>
             <a:endParaRPr lang="en-US" b="1" dirty="0">
               <a:effectLst>
@@ -3439,13 +4108,13 @@
       </p:sp>
       <p:sp>
         <p:nvSpPr>
-          <p:cNvPr id="18" name="TextBox 17"/>
+          <p:cNvPr id="29" name="TextBox 28"/>
           <p:cNvSpPr txBox="1"/>
           <p:nvPr/>
         </p:nvSpPr>
         <p:spPr>
           <a:xfrm>
-            <a:off x="7567751" y="5386586"/>
+            <a:off x="6346373" y="7017727"/>
             <a:ext cx="2442754" cy="369332"/>
           </a:xfrm>
           <a:prstGeom prst="rect">
@@ -3479,7 +4148,22 @@
                   </a:outerShdw>
                 </a:effectLst>
               </a:rPr>
-              <a:t>(viii)</a:t>
+              <a:t>(ix</a:t>
+            </a:r>
+            <a:r>
+              <a:rPr lang="en-US" b="1" dirty="0" smtClean="0">
+                <a:effectLst>
+                  <a:glow rad="50800">
+                    <a:schemeClr val="bg1">
+                      <a:alpha val="50000"/>
+                    </a:schemeClr>
+                  </a:glow>
+                  <a:outerShdw blurRad="127000" dir="5400000" algn="ctr" rotWithShape="0">
+                    <a:schemeClr val="bg1"/>
+                  </a:outerShdw>
+                </a:effectLst>
+              </a:rPr>
+              <a:t>)</a:t>
             </a:r>
             <a:endParaRPr lang="en-US" b="1" dirty="0">
               <a:effectLst>
@@ -3498,13 +4182,13 @@
       </p:sp>
       <p:sp>
         <p:nvSpPr>
-          <p:cNvPr id="19" name="TextBox 18"/>
+          <p:cNvPr id="30" name="TextBox 29"/>
           <p:cNvSpPr txBox="1"/>
           <p:nvPr/>
         </p:nvSpPr>
         <p:spPr>
           <a:xfrm>
-            <a:off x="7317378" y="1859014"/>
+            <a:off x="10397247" y="7353970"/>
             <a:ext cx="2442754" cy="369332"/>
           </a:xfrm>
           <a:prstGeom prst="rect">
@@ -3526,6 +4210,116 @@
           <a:lstStyle/>
           <a:p>
             <a:r>
+              <a:rPr lang="en-US" b="1" dirty="0" smtClean="0">
+                <a:effectLst>
+                  <a:glow rad="50800">
+                    <a:schemeClr val="bg1">
+                      <a:alpha val="50000"/>
+                    </a:schemeClr>
+                  </a:glow>
+                  <a:outerShdw blurRad="127000" dir="5400000" algn="ctr" rotWithShape="0">
+                    <a:schemeClr val="bg1"/>
+                  </a:outerShdw>
+                </a:effectLst>
+              </a:rPr>
+              <a:t>(x</a:t>
+            </a:r>
+            <a:r>
+              <a:rPr lang="en-US" b="1" dirty="0" smtClean="0">
+                <a:effectLst>
+                  <a:glow rad="50800">
+                    <a:schemeClr val="bg1">
+                      <a:alpha val="50000"/>
+                    </a:schemeClr>
+                  </a:glow>
+                  <a:outerShdw blurRad="127000" dir="5400000" algn="ctr" rotWithShape="0">
+                    <a:schemeClr val="bg1"/>
+                  </a:outerShdw>
+                </a:effectLst>
+              </a:rPr>
+              <a:t>)</a:t>
+            </a:r>
+            <a:endParaRPr lang="en-US" b="1" dirty="0">
+              <a:effectLst>
+                <a:glow rad="50800">
+                  <a:schemeClr val="bg1">
+                    <a:alpha val="50000"/>
+                  </a:schemeClr>
+                </a:glow>
+                <a:outerShdw blurRad="127000" dir="5400000" algn="ctr" rotWithShape="0">
+                  <a:schemeClr val="bg1"/>
+                </a:outerShdw>
+              </a:effectLst>
+            </a:endParaRPr>
+          </a:p>
+        </p:txBody>
+      </p:sp>
+      <p:cxnSp>
+        <p:nvCxnSpPr>
+          <p:cNvPr id="5" name="Straight Arrow Connector 4"/>
+          <p:cNvCxnSpPr/>
+          <p:nvPr/>
+        </p:nvCxnSpPr>
+        <p:spPr>
+          <a:xfrm flipH="1">
+            <a:off x="5932433" y="7336013"/>
+            <a:ext cx="498249" cy="594280"/>
+          </a:xfrm>
+          <a:prstGeom prst="straightConnector1">
+            <a:avLst/>
+          </a:prstGeom>
+          <a:ln w="38100">
+            <a:solidFill>
+              <a:schemeClr val="tx1"/>
+            </a:solidFill>
+            <a:tailEnd type="triangle"/>
+          </a:ln>
+        </p:spPr>
+        <p:style>
+          <a:lnRef idx="1">
+            <a:schemeClr val="accent1"/>
+          </a:lnRef>
+          <a:fillRef idx="0">
+            <a:schemeClr val="accent1"/>
+          </a:fillRef>
+          <a:effectRef idx="0">
+            <a:schemeClr val="accent1"/>
+          </a:effectRef>
+          <a:fontRef idx="minor">
+            <a:schemeClr val="tx1"/>
+          </a:fontRef>
+        </p:style>
+      </p:cxnSp>
+      <p:sp>
+        <p:nvSpPr>
+          <p:cNvPr id="31" name="TextBox 30"/>
+          <p:cNvSpPr txBox="1"/>
+          <p:nvPr/>
+        </p:nvSpPr>
+        <p:spPr>
+          <a:xfrm>
+            <a:off x="4587626" y="9739935"/>
+            <a:ext cx="2442754" cy="369332"/>
+          </a:xfrm>
+          <a:prstGeom prst="rect">
+            <a:avLst/>
+          </a:prstGeom>
+          <a:noFill/>
+          <a:effectLst>
+            <a:glow>
+              <a:schemeClr val="bg1">
+                <a:alpha val="40000"/>
+              </a:schemeClr>
+            </a:glow>
+          </a:effectLst>
+        </p:spPr>
+        <p:txBody>
+          <a:bodyPr wrap="square" rtlCol="0">
+            <a:spAutoFit/>
+          </a:bodyPr>
+          <a:lstStyle/>
+          <a:p>
+            <a:r>
               <a:rPr lang="en-US" b="1" smtClean="0">
                 <a:effectLst>
                   <a:glow rad="50800">
@@ -3538,7 +4332,22 @@
                   </a:outerShdw>
                 </a:effectLst>
               </a:rPr>
-              <a:t>(ix)</a:t>
+              <a:t>(vii</a:t>
+            </a:r>
+            <a:r>
+              <a:rPr lang="en-US" b="1" smtClean="0">
+                <a:effectLst>
+                  <a:glow rad="50800">
+                    <a:schemeClr val="bg1">
+                      <a:alpha val="50000"/>
+                    </a:schemeClr>
+                  </a:glow>
+                  <a:outerShdw blurRad="127000" dir="5400000" algn="ctr" rotWithShape="0">
+                    <a:schemeClr val="bg1"/>
+                  </a:outerShdw>
+                </a:effectLst>
+              </a:rPr>
+              <a:t>)</a:t>
             </a:r>
             <a:endParaRPr lang="en-US" b="1" dirty="0">
               <a:effectLst>
@@ -3555,6 +4364,42 @@
           </a:p>
         </p:txBody>
       </p:sp>
+      <p:cxnSp>
+        <p:nvCxnSpPr>
+          <p:cNvPr id="32" name="Straight Arrow Connector 31"/>
+          <p:cNvCxnSpPr/>
+          <p:nvPr/>
+        </p:nvCxnSpPr>
+        <p:spPr>
+          <a:xfrm flipV="1">
+            <a:off x="4435366" y="9196552"/>
+            <a:ext cx="388882" cy="421913"/>
+          </a:xfrm>
+          <a:prstGeom prst="straightConnector1">
+            <a:avLst/>
+          </a:prstGeom>
+          <a:ln w="38100">
+            <a:solidFill>
+              <a:schemeClr val="tx1"/>
+            </a:solidFill>
+            <a:tailEnd type="triangle"/>
+          </a:ln>
+        </p:spPr>
+        <p:style>
+          <a:lnRef idx="1">
+            <a:schemeClr val="accent1"/>
+          </a:lnRef>
+          <a:fillRef idx="0">
+            <a:schemeClr val="accent1"/>
+          </a:fillRef>
+          <a:effectRef idx="0">
+            <a:schemeClr val="accent1"/>
+          </a:effectRef>
+          <a:fontRef idx="minor">
+            <a:schemeClr val="tx1"/>
+          </a:fontRef>
+        </p:style>
+      </p:cxnSp>
     </p:spTree>
     <p:extLst>
       <p:ext uri="{BB962C8B-B14F-4D97-AF65-F5344CB8AC3E}">
@@ -3578,7 +4423,7 @@
 <file path=ppt/theme/theme1.xml><?xml version="1.0" encoding="utf-8"?>
 <a:theme xmlns:a="http://schemas.openxmlformats.org/drawingml/2006/main" name="Office Theme">
   <a:themeElements>
-    <a:clrScheme name="Office">
+    <a:clrScheme name="Office Theme">
       <a:dk1>
         <a:sysClr val="windowText" lastClr="000000"/>
       </a:dk1>
@@ -3616,14 +4461,14 @@
         <a:srgbClr val="954F72"/>
       </a:folHlink>
     </a:clrScheme>
-    <a:fontScheme name="Office">
+    <a:fontScheme name="Office Theme">
       <a:majorFont>
         <a:latin typeface="Calibri Light" panose="020F0302020204030204"/>
         <a:ea typeface=""/>
         <a:cs typeface=""/>
-        <a:font script="Jpan" typeface="Yu Gothic Light"/>
+        <a:font script="Jpan" typeface="游ゴシック Light"/>
         <a:font script="Hang" typeface="맑은 고딕"/>
-        <a:font script="Hans" typeface="DengXian Light"/>
+        <a:font script="Hans" typeface="等线 Light"/>
         <a:font script="Hant" typeface="新細明體"/>
         <a:font script="Arab" typeface="Times New Roman"/>
         <a:font script="Hebr" typeface="Times New Roman"/>
@@ -3656,9 +4501,9 @@
         <a:latin typeface="Calibri" panose="020F0502020204030204"/>
         <a:ea typeface=""/>
         <a:cs typeface=""/>
-        <a:font script="Jpan" typeface="Yu Gothic"/>
+        <a:font script="Jpan" typeface="游ゴシック"/>
         <a:font script="Hang" typeface="맑은 고딕"/>
-        <a:font script="Hans" typeface="DengXian"/>
+        <a:font script="Hans" typeface="等线"/>
         <a:font script="Hant" typeface="新細明體"/>
         <a:font script="Arab" typeface="Arial"/>
         <a:font script="Hebr" typeface="Arial"/>
@@ -3688,7 +4533,7 @@
         <a:font script="Geor" typeface="Sylfaen"/>
       </a:minorFont>
     </a:fontScheme>
-    <a:fmtScheme name="Office">
+    <a:fmtScheme name="Office Theme">
       <a:fillStyleLst>
         <a:solidFill>
           <a:schemeClr val="phClr"/>

</xml_diff>